<commit_message>
Updating slides with link to Jessicas video
</commit_message>
<xml_diff>
--- a/public/slides/global-diversity-cfp-day.pptx
+++ b/public/slides/global-diversity-cfp-day.pptx
@@ -4304,8 +4304,8 @@
         </p:nvSpPr>
         <p:spPr>
           <a:xfrm>
-            <a:off x="1269999" y="1940272"/>
-            <a:ext cx="10464801" cy="1493739"/>
+            <a:off x="1270000" y="1940272"/>
+            <a:ext cx="10464800" cy="1493739"/>
           </a:xfrm>
           <a:prstGeom prst="rect">
             <a:avLst/>
@@ -5123,7 +5123,9 @@
       </p:grpSpPr>
       <p:sp>
         <p:nvSpPr>
-          <p:cNvPr id="181" name="The day of your talk"/>
+          <p:cNvPr id="181" name="The day of your talk">
+            <a:hlinkClick r:id="rId2" invalidUrl="" action="" tgtFrame="" tooltip="" history="1" highlightClick="0" endSnd="0"/>
+          </p:cNvPr>
           <p:cNvSpPr txBox="1"/>
           <p:nvPr>
             <p:ph type="ctrTitle"/>

</xml_diff>

<commit_message>
Updating schedule "Caring for your audience" info
</commit_message>
<xml_diff>
--- a/public/slides/global-diversity-cfp-day.pptx
+++ b/public/slides/global-diversity-cfp-day.pptx
@@ -1,6 +1,6 @@
 
 <file path=ppt/presentation.xml><?xml version="1.0" encoding="utf-8"?>
-<p:presentation xmlns:a="http://schemas.openxmlformats.org/drawingml/2006/main" xmlns:r="http://schemas.openxmlformats.org/officeDocument/2006/relationships" xmlns:p="http://schemas.openxmlformats.org/presentationml/2006/main">
+<p:presentation xmlns:a="http://schemas.openxmlformats.org/drawingml/2006/main" xmlns:r="http://schemas.openxmlformats.org/officeDocument/2006/relationships" xmlns:p="http://schemas.openxmlformats.org/presentationml/2006/main" xmlns:m="http://schemas.openxmlformats.org/officeDocument/2006/math" xmlns:a14="http://schemas.microsoft.com/office/drawing/2010/main">
   <p:sldMasterIdLst>
     <p:sldMasterId id="2147483648" r:id="rId5"/>
   </p:sldMasterIdLst>
@@ -42,6 +42,11 @@
     <p:sldId id="287" r:id="rId39"/>
     <p:sldId id="288" r:id="rId40"/>
     <p:sldId id="289" r:id="rId41"/>
+    <p:sldId id="290" r:id="rId42"/>
+    <p:sldId id="291" r:id="rId43"/>
+    <p:sldId id="292" r:id="rId44"/>
+    <p:sldId id="293" r:id="rId45"/>
+    <p:sldId id="294" r:id="rId46"/>
   </p:sldIdLst>
   <p:sldSz cx="13004800" cy="9753600"/>
   <p:notesSz cx="6858000" cy="9144000"/>
@@ -347,11 +352,11 @@
 </file>
 
 <file path=ppt/commentAuthors.xml><?xml version="1.0" encoding="utf-8"?>
-<p:cmAuthorLst xmlns:a="http://schemas.openxmlformats.org/drawingml/2006/main" xmlns:r="http://schemas.openxmlformats.org/officeDocument/2006/relationships" xmlns:p="http://schemas.openxmlformats.org/presentationml/2006/main"/>
+<p:cmAuthorLst xmlns:a="http://schemas.openxmlformats.org/drawingml/2006/main" xmlns:r="http://schemas.openxmlformats.org/officeDocument/2006/relationships" xmlns:p="http://schemas.openxmlformats.org/presentationml/2006/main" xmlns:m="http://schemas.openxmlformats.org/officeDocument/2006/math" xmlns:a14="http://schemas.microsoft.com/office/drawing/2010/main"/>
 </file>
 
 <file path=ppt/notesMasters/notesMaster1.xml><?xml version="1.0" encoding="utf-8"?>
-<p:notesMaster xmlns:a="http://schemas.openxmlformats.org/drawingml/2006/main" xmlns:r="http://schemas.openxmlformats.org/officeDocument/2006/relationships" xmlns:p="http://schemas.openxmlformats.org/presentationml/2006/main">
+<p:notesMaster xmlns:a="http://schemas.openxmlformats.org/drawingml/2006/main" xmlns:r="http://schemas.openxmlformats.org/officeDocument/2006/relationships" xmlns:p="http://schemas.openxmlformats.org/presentationml/2006/main" xmlns:m="http://schemas.openxmlformats.org/officeDocument/2006/math" xmlns:a14="http://schemas.microsoft.com/office/drawing/2010/main">
   <p:cSld>
     <p:spTree>
       <p:nvGrpSpPr>
@@ -525,7 +530,7 @@
 </file>
 
 <file path=ppt/slideLayouts/slideLayout1.xml><?xml version="1.0" encoding="utf-8"?>
-<p:sldLayout xmlns:a="http://schemas.openxmlformats.org/drawingml/2006/main" xmlns:r="http://schemas.openxmlformats.org/officeDocument/2006/relationships" xmlns:p="http://schemas.openxmlformats.org/presentationml/2006/main" type="title" showMasterSp="1" showMasterPhAnim="1">
+<p:sldLayout xmlns:a="http://schemas.openxmlformats.org/drawingml/2006/main" xmlns:r="http://schemas.openxmlformats.org/officeDocument/2006/relationships" xmlns:p="http://schemas.openxmlformats.org/presentationml/2006/main" xmlns:m="http://schemas.openxmlformats.org/officeDocument/2006/math" xmlns:a14="http://schemas.microsoft.com/office/drawing/2010/main" type="title" showMasterSp="1" showMasterPhAnim="1">
   <p:cSld name="Title &amp; Subtitle">
     <p:spTree>
       <p:nvGrpSpPr>
@@ -699,7 +704,7 @@
 </file>
 
 <file path=ppt/slideLayouts/slideLayout10.xml><?xml version="1.0" encoding="utf-8"?>
-<p:sldLayout xmlns:a="http://schemas.openxmlformats.org/drawingml/2006/main" xmlns:r="http://schemas.openxmlformats.org/officeDocument/2006/relationships" xmlns:p="http://schemas.openxmlformats.org/presentationml/2006/main" type="tx" showMasterSp="1" showMasterPhAnim="1">
+<p:sldLayout xmlns:a="http://schemas.openxmlformats.org/drawingml/2006/main" xmlns:r="http://schemas.openxmlformats.org/officeDocument/2006/relationships" xmlns:p="http://schemas.openxmlformats.org/presentationml/2006/main" xmlns:m="http://schemas.openxmlformats.org/officeDocument/2006/math" xmlns:a14="http://schemas.microsoft.com/office/drawing/2010/main" type="tx" showMasterSp="1" showMasterPhAnim="1">
   <p:cSld name="Quote">
     <p:spTree>
       <p:nvGrpSpPr>
@@ -832,7 +837,7 @@
 </file>
 
 <file path=ppt/slideLayouts/slideLayout11.xml><?xml version="1.0" encoding="utf-8"?>
-<p:sldLayout xmlns:a="http://schemas.openxmlformats.org/drawingml/2006/main" xmlns:r="http://schemas.openxmlformats.org/officeDocument/2006/relationships" xmlns:p="http://schemas.openxmlformats.org/presentationml/2006/main" type="tx" showMasterSp="1" showMasterPhAnim="1">
+<p:sldLayout xmlns:a="http://schemas.openxmlformats.org/drawingml/2006/main" xmlns:r="http://schemas.openxmlformats.org/officeDocument/2006/relationships" xmlns:p="http://schemas.openxmlformats.org/presentationml/2006/main" xmlns:m="http://schemas.openxmlformats.org/officeDocument/2006/math" xmlns:a14="http://schemas.microsoft.com/office/drawing/2010/main" type="tx" showMasterSp="1" showMasterPhAnim="1">
   <p:cSld name="Photo">
     <p:spTree>
       <p:nvGrpSpPr>
@@ -858,8 +863,8 @@
         </p:nvSpPr>
         <p:spPr>
           <a:xfrm>
-            <a:off x="0" y="0"/>
-            <a:ext cx="13004800" cy="9753600"/>
+            <a:off x="-929606" y="-12700"/>
+            <a:ext cx="16551777" cy="11034518"/>
           </a:xfrm>
           <a:prstGeom prst="rect">
             <a:avLst/>
@@ -907,7 +912,7 @@
 </file>
 
 <file path=ppt/slideLayouts/slideLayout12.xml><?xml version="1.0" encoding="utf-8"?>
-<p:sldLayout xmlns:a="http://schemas.openxmlformats.org/drawingml/2006/main" xmlns:r="http://schemas.openxmlformats.org/officeDocument/2006/relationships" xmlns:p="http://schemas.openxmlformats.org/presentationml/2006/main" type="tx" showMasterSp="1" showMasterPhAnim="1">
+<p:sldLayout xmlns:a="http://schemas.openxmlformats.org/drawingml/2006/main" xmlns:r="http://schemas.openxmlformats.org/officeDocument/2006/relationships" xmlns:p="http://schemas.openxmlformats.org/presentationml/2006/main" xmlns:m="http://schemas.openxmlformats.org/officeDocument/2006/math" xmlns:a14="http://schemas.microsoft.com/office/drawing/2010/main" type="tx" showMasterSp="1" showMasterPhAnim="1">
   <p:cSld name="Blank">
     <p:spTree>
       <p:nvGrpSpPr>
@@ -955,7 +960,7 @@
 </file>
 
 <file path=ppt/slideLayouts/slideLayout2.xml><?xml version="1.0" encoding="utf-8"?>
-<p:sldLayout xmlns:a="http://schemas.openxmlformats.org/drawingml/2006/main" xmlns:r="http://schemas.openxmlformats.org/officeDocument/2006/relationships" xmlns:p="http://schemas.openxmlformats.org/presentationml/2006/main" type="tx" showMasterSp="1" showMasterPhAnim="1">
+<p:sldLayout xmlns:a="http://schemas.openxmlformats.org/drawingml/2006/main" xmlns:r="http://schemas.openxmlformats.org/officeDocument/2006/relationships" xmlns:p="http://schemas.openxmlformats.org/presentationml/2006/main" xmlns:m="http://schemas.openxmlformats.org/officeDocument/2006/math" xmlns:a14="http://schemas.microsoft.com/office/drawing/2010/main" type="tx" showMasterSp="1" showMasterPhAnim="1">
   <p:cSld name="Photo - Horizontal">
     <p:spTree>
       <p:nvGrpSpPr>
@@ -981,8 +986,8 @@
         </p:nvSpPr>
         <p:spPr>
           <a:xfrm>
-            <a:off x="1619250" y="673100"/>
-            <a:ext cx="9758016" cy="5905500"/>
+            <a:off x="-647700" y="508000"/>
+            <a:ext cx="12369801" cy="6142538"/>
           </a:xfrm>
           <a:prstGeom prst="rect">
             <a:avLst/>
@@ -1156,7 +1161,7 @@
 </file>
 
 <file path=ppt/slideLayouts/slideLayout3.xml><?xml version="1.0" encoding="utf-8"?>
-<p:sldLayout xmlns:a="http://schemas.openxmlformats.org/drawingml/2006/main" xmlns:r="http://schemas.openxmlformats.org/officeDocument/2006/relationships" xmlns:p="http://schemas.openxmlformats.org/presentationml/2006/main" type="tx" showMasterSp="1" showMasterPhAnim="1">
+<p:sldLayout xmlns:a="http://schemas.openxmlformats.org/drawingml/2006/main" xmlns:r="http://schemas.openxmlformats.org/officeDocument/2006/relationships" xmlns:p="http://schemas.openxmlformats.org/presentationml/2006/main" xmlns:m="http://schemas.openxmlformats.org/officeDocument/2006/math" xmlns:a14="http://schemas.microsoft.com/office/drawing/2010/main" type="tx" showMasterSp="1" showMasterPhAnim="1">
   <p:cSld name="Title - Center">
     <p:spTree>
       <p:nvGrpSpPr>
@@ -1232,7 +1237,7 @@
 </file>
 
 <file path=ppt/slideLayouts/slideLayout4.xml><?xml version="1.0" encoding="utf-8"?>
-<p:sldLayout xmlns:a="http://schemas.openxmlformats.org/drawingml/2006/main" xmlns:r="http://schemas.openxmlformats.org/officeDocument/2006/relationships" xmlns:p="http://schemas.openxmlformats.org/presentationml/2006/main" type="tx" showMasterSp="1" showMasterPhAnim="1">
+<p:sldLayout xmlns:a="http://schemas.openxmlformats.org/drawingml/2006/main" xmlns:r="http://schemas.openxmlformats.org/officeDocument/2006/relationships" xmlns:p="http://schemas.openxmlformats.org/presentationml/2006/main" xmlns:m="http://schemas.openxmlformats.org/officeDocument/2006/math" xmlns:a14="http://schemas.microsoft.com/office/drawing/2010/main" type="tx" showMasterSp="1" showMasterPhAnim="1">
   <p:cSld name="Photo - Vertical">
     <p:spTree>
       <p:nvGrpSpPr>
@@ -1253,13 +1258,13 @@
           <p:cNvPr id="38" name="Image"/>
           <p:cNvSpPr/>
           <p:nvPr>
-            <p:ph type="pic" sz="half" idx="13"/>
+            <p:ph type="pic" idx="13"/>
           </p:nvPr>
         </p:nvSpPr>
         <p:spPr>
           <a:xfrm>
-            <a:off x="6718300" y="638919"/>
-            <a:ext cx="5334001" cy="8216901"/>
+            <a:off x="2451058" y="-138499"/>
+            <a:ext cx="13525502" cy="9017002"/>
           </a:xfrm>
           <a:prstGeom prst="rect">
             <a:avLst/>
@@ -1437,7 +1442,7 @@
 </file>
 
 <file path=ppt/slideLayouts/slideLayout5.xml><?xml version="1.0" encoding="utf-8"?>
-<p:sldLayout xmlns:a="http://schemas.openxmlformats.org/drawingml/2006/main" xmlns:r="http://schemas.openxmlformats.org/officeDocument/2006/relationships" xmlns:p="http://schemas.openxmlformats.org/presentationml/2006/main" type="tx" showMasterSp="1" showMasterPhAnim="1">
+<p:sldLayout xmlns:a="http://schemas.openxmlformats.org/drawingml/2006/main" xmlns:r="http://schemas.openxmlformats.org/officeDocument/2006/relationships" xmlns:p="http://schemas.openxmlformats.org/presentationml/2006/main" xmlns:m="http://schemas.openxmlformats.org/officeDocument/2006/math" xmlns:a14="http://schemas.microsoft.com/office/drawing/2010/main" type="tx" showMasterSp="1" showMasterPhAnim="1">
   <p:cSld name="Title - Top">
     <p:spTree>
       <p:nvGrpSpPr>
@@ -1509,7 +1514,7 @@
 </file>
 
 <file path=ppt/slideLayouts/slideLayout6.xml><?xml version="1.0" encoding="utf-8"?>
-<p:sldLayout xmlns:a="http://schemas.openxmlformats.org/drawingml/2006/main" xmlns:r="http://schemas.openxmlformats.org/officeDocument/2006/relationships" xmlns:p="http://schemas.openxmlformats.org/presentationml/2006/main" type="tx" showMasterSp="1" showMasterPhAnim="1">
+<p:sldLayout xmlns:a="http://schemas.openxmlformats.org/drawingml/2006/main" xmlns:r="http://schemas.openxmlformats.org/officeDocument/2006/relationships" xmlns:p="http://schemas.openxmlformats.org/presentationml/2006/main" xmlns:m="http://schemas.openxmlformats.org/officeDocument/2006/math" xmlns:a14="http://schemas.microsoft.com/office/drawing/2010/main" type="tx" showMasterSp="1" showMasterPhAnim="1">
   <p:cSld name="Title &amp; Bullets">
     <p:spTree>
       <p:nvGrpSpPr>
@@ -1645,7 +1650,7 @@
 </file>
 
 <file path=ppt/slideLayouts/slideLayout7.xml><?xml version="1.0" encoding="utf-8"?>
-<p:sldLayout xmlns:a="http://schemas.openxmlformats.org/drawingml/2006/main" xmlns:r="http://schemas.openxmlformats.org/officeDocument/2006/relationships" xmlns:p="http://schemas.openxmlformats.org/presentationml/2006/main" type="tx" showMasterSp="1" showMasterPhAnim="1">
+<p:sldLayout xmlns:a="http://schemas.openxmlformats.org/drawingml/2006/main" xmlns:r="http://schemas.openxmlformats.org/officeDocument/2006/relationships" xmlns:p="http://schemas.openxmlformats.org/presentationml/2006/main" xmlns:m="http://schemas.openxmlformats.org/officeDocument/2006/math" xmlns:a14="http://schemas.microsoft.com/office/drawing/2010/main" type="tx" showMasterSp="1" showMasterPhAnim="1">
   <p:cSld name="Title, Bullets &amp; Photo">
     <p:spTree>
       <p:nvGrpSpPr>
@@ -1666,13 +1671,13 @@
           <p:cNvPr id="65" name="Image"/>
           <p:cNvSpPr/>
           <p:nvPr>
-            <p:ph type="pic" sz="half" idx="13"/>
+            <p:ph type="pic" idx="13"/>
           </p:nvPr>
         </p:nvSpPr>
         <p:spPr>
           <a:xfrm>
-            <a:off x="6718300" y="2590800"/>
-            <a:ext cx="5334000" cy="6286500"/>
+            <a:off x="4473575" y="2032000"/>
+            <a:ext cx="10287000" cy="6858000"/>
           </a:xfrm>
           <a:prstGeom prst="rect">
             <a:avLst/>
@@ -1832,7 +1837,7 @@
 </file>
 
 <file path=ppt/slideLayouts/slideLayout8.xml><?xml version="1.0" encoding="utf-8"?>
-<p:sldLayout xmlns:a="http://schemas.openxmlformats.org/drawingml/2006/main" xmlns:r="http://schemas.openxmlformats.org/officeDocument/2006/relationships" xmlns:p="http://schemas.openxmlformats.org/presentationml/2006/main" type="tx" showMasterSp="1" showMasterPhAnim="1">
+<p:sldLayout xmlns:a="http://schemas.openxmlformats.org/drawingml/2006/main" xmlns:r="http://schemas.openxmlformats.org/officeDocument/2006/relationships" xmlns:p="http://schemas.openxmlformats.org/presentationml/2006/main" xmlns:m="http://schemas.openxmlformats.org/officeDocument/2006/math" xmlns:a14="http://schemas.microsoft.com/office/drawing/2010/main" type="tx" showMasterSp="1" showMasterPhAnim="1">
   <p:cSld name="Bullets">
     <p:spTree>
       <p:nvGrpSpPr>
@@ -1948,7 +1953,7 @@
 </file>
 
 <file path=ppt/slideLayouts/slideLayout9.xml><?xml version="1.0" encoding="utf-8"?>
-<p:sldLayout xmlns:a="http://schemas.openxmlformats.org/drawingml/2006/main" xmlns:r="http://schemas.openxmlformats.org/officeDocument/2006/relationships" xmlns:p="http://schemas.openxmlformats.org/presentationml/2006/main" type="tx" showMasterSp="1" showMasterPhAnim="1">
+<p:sldLayout xmlns:a="http://schemas.openxmlformats.org/drawingml/2006/main" xmlns:r="http://schemas.openxmlformats.org/officeDocument/2006/relationships" xmlns:p="http://schemas.openxmlformats.org/presentationml/2006/main" xmlns:m="http://schemas.openxmlformats.org/officeDocument/2006/math" xmlns:a14="http://schemas.microsoft.com/office/drawing/2010/main" type="tx" showMasterSp="1" showMasterPhAnim="1">
   <p:cSld name="Photo - 3 Up">
     <p:spTree>
       <p:nvGrpSpPr>
@@ -1974,8 +1979,8 @@
         </p:nvSpPr>
         <p:spPr>
           <a:xfrm>
-            <a:off x="6731000" y="4965700"/>
-            <a:ext cx="5334000" cy="3898900"/>
+            <a:off x="6426200" y="4965700"/>
+            <a:ext cx="5886450" cy="3924300"/>
           </a:xfrm>
           <a:prstGeom prst="rect">
             <a:avLst/>
@@ -2001,8 +2006,8 @@
         </p:nvSpPr>
         <p:spPr>
           <a:xfrm>
-            <a:off x="6731000" y="635000"/>
-            <a:ext cx="5334000" cy="3898900"/>
+            <a:off x="6737350" y="639233"/>
+            <a:ext cx="5880100" cy="3920067"/>
           </a:xfrm>
           <a:prstGeom prst="rect">
             <a:avLst/>
@@ -2023,13 +2028,13 @@
           <p:cNvPr id="85" name="Image"/>
           <p:cNvSpPr/>
           <p:nvPr>
-            <p:ph type="pic" sz="half" idx="15"/>
+            <p:ph type="pic" idx="15"/>
           </p:nvPr>
         </p:nvSpPr>
         <p:spPr>
           <a:xfrm>
-            <a:off x="952500" y="635000"/>
-            <a:ext cx="5334000" cy="8229600"/>
+            <a:off x="-3400425" y="-127000"/>
+            <a:ext cx="13525500" cy="9017000"/>
           </a:xfrm>
           <a:prstGeom prst="rect">
             <a:avLst/>
@@ -2077,7 +2082,7 @@
 </file>
 
 <file path=ppt/slideMasters/slideMaster1.xml><?xml version="1.0" encoding="utf-8"?>
-<p:sldMaster xmlns:a="http://schemas.openxmlformats.org/drawingml/2006/main" xmlns:r="http://schemas.openxmlformats.org/officeDocument/2006/relationships" xmlns:p="http://schemas.openxmlformats.org/presentationml/2006/main">
+<p:sldMaster xmlns:a="http://schemas.openxmlformats.org/drawingml/2006/main" xmlns:r="http://schemas.openxmlformats.org/officeDocument/2006/relationships" xmlns:p="http://schemas.openxmlformats.org/presentationml/2006/main" xmlns:m="http://schemas.openxmlformats.org/officeDocument/2006/math" xmlns:a14="http://schemas.microsoft.com/office/drawing/2010/main">
   <p:cSld>
     <p:bg>
       <p:bgPr>
@@ -2276,9 +2281,6 @@
         <a:buNone/>
         <a:tabLst/>
         <a:defRPr b="0" baseline="0" cap="none" i="0" spc="0" strike="noStrike" sz="8000" u="none">
-          <a:ln>
-            <a:noFill/>
-          </a:ln>
           <a:solidFill>
             <a:srgbClr val="FFFFFF"/>
           </a:solidFill>
@@ -2305,9 +2307,6 @@
         <a:buNone/>
         <a:tabLst/>
         <a:defRPr b="0" baseline="0" cap="none" i="0" spc="0" strike="noStrike" sz="8000" u="none">
-          <a:ln>
-            <a:noFill/>
-          </a:ln>
           <a:solidFill>
             <a:srgbClr val="FFFFFF"/>
           </a:solidFill>
@@ -2334,9 +2333,6 @@
         <a:buNone/>
         <a:tabLst/>
         <a:defRPr b="0" baseline="0" cap="none" i="0" spc="0" strike="noStrike" sz="8000" u="none">
-          <a:ln>
-            <a:noFill/>
-          </a:ln>
           <a:solidFill>
             <a:srgbClr val="FFFFFF"/>
           </a:solidFill>
@@ -2363,9 +2359,6 @@
         <a:buNone/>
         <a:tabLst/>
         <a:defRPr b="0" baseline="0" cap="none" i="0" spc="0" strike="noStrike" sz="8000" u="none">
-          <a:ln>
-            <a:noFill/>
-          </a:ln>
           <a:solidFill>
             <a:srgbClr val="FFFFFF"/>
           </a:solidFill>
@@ -2392,9 +2385,6 @@
         <a:buNone/>
         <a:tabLst/>
         <a:defRPr b="0" baseline="0" cap="none" i="0" spc="0" strike="noStrike" sz="8000" u="none">
-          <a:ln>
-            <a:noFill/>
-          </a:ln>
           <a:solidFill>
             <a:srgbClr val="FFFFFF"/>
           </a:solidFill>
@@ -2421,9 +2411,6 @@
         <a:buNone/>
         <a:tabLst/>
         <a:defRPr b="0" baseline="0" cap="none" i="0" spc="0" strike="noStrike" sz="8000" u="none">
-          <a:ln>
-            <a:noFill/>
-          </a:ln>
           <a:solidFill>
             <a:srgbClr val="FFFFFF"/>
           </a:solidFill>
@@ -2450,9 +2437,6 @@
         <a:buNone/>
         <a:tabLst/>
         <a:defRPr b="0" baseline="0" cap="none" i="0" spc="0" strike="noStrike" sz="8000" u="none">
-          <a:ln>
-            <a:noFill/>
-          </a:ln>
           <a:solidFill>
             <a:srgbClr val="FFFFFF"/>
           </a:solidFill>
@@ -2479,9 +2463,6 @@
         <a:buNone/>
         <a:tabLst/>
         <a:defRPr b="0" baseline="0" cap="none" i="0" spc="0" strike="noStrike" sz="8000" u="none">
-          <a:ln>
-            <a:noFill/>
-          </a:ln>
           <a:solidFill>
             <a:srgbClr val="FFFFFF"/>
           </a:solidFill>
@@ -2508,9 +2489,6 @@
         <a:buNone/>
         <a:tabLst/>
         <a:defRPr b="0" baseline="0" cap="none" i="0" spc="0" strike="noStrike" sz="8000" u="none">
-          <a:ln>
-            <a:noFill/>
-          </a:ln>
           <a:solidFill>
             <a:srgbClr val="FFFFFF"/>
           </a:solidFill>
@@ -2541,9 +2519,6 @@
         <a:buChar char="•"/>
         <a:tabLst/>
         <a:defRPr b="0" baseline="0" cap="none" i="0" spc="0" strike="noStrike" sz="3200" u="none">
-          <a:ln>
-            <a:noFill/>
-          </a:ln>
           <a:solidFill>
             <a:srgbClr val="FFFFFF"/>
           </a:solidFill>
@@ -2572,9 +2547,6 @@
         <a:buChar char="•"/>
         <a:tabLst/>
         <a:defRPr b="0" baseline="0" cap="none" i="0" spc="0" strike="noStrike" sz="3200" u="none">
-          <a:ln>
-            <a:noFill/>
-          </a:ln>
           <a:solidFill>
             <a:srgbClr val="FFFFFF"/>
           </a:solidFill>
@@ -2603,9 +2575,6 @@
         <a:buChar char="•"/>
         <a:tabLst/>
         <a:defRPr b="0" baseline="0" cap="none" i="0" spc="0" strike="noStrike" sz="3200" u="none">
-          <a:ln>
-            <a:noFill/>
-          </a:ln>
           <a:solidFill>
             <a:srgbClr val="FFFFFF"/>
           </a:solidFill>
@@ -2634,9 +2603,6 @@
         <a:buChar char="•"/>
         <a:tabLst/>
         <a:defRPr b="0" baseline="0" cap="none" i="0" spc="0" strike="noStrike" sz="3200" u="none">
-          <a:ln>
-            <a:noFill/>
-          </a:ln>
           <a:solidFill>
             <a:srgbClr val="FFFFFF"/>
           </a:solidFill>
@@ -2665,9 +2631,6 @@
         <a:buChar char="•"/>
         <a:tabLst/>
         <a:defRPr b="0" baseline="0" cap="none" i="0" spc="0" strike="noStrike" sz="3200" u="none">
-          <a:ln>
-            <a:noFill/>
-          </a:ln>
           <a:solidFill>
             <a:srgbClr val="FFFFFF"/>
           </a:solidFill>
@@ -2696,9 +2659,6 @@
         <a:buChar char="•"/>
         <a:tabLst/>
         <a:defRPr b="0" baseline="0" cap="none" i="0" spc="0" strike="noStrike" sz="3200" u="none">
-          <a:ln>
-            <a:noFill/>
-          </a:ln>
           <a:solidFill>
             <a:srgbClr val="FFFFFF"/>
           </a:solidFill>
@@ -2727,9 +2687,6 @@
         <a:buChar char="•"/>
         <a:tabLst/>
         <a:defRPr b="0" baseline="0" cap="none" i="0" spc="0" strike="noStrike" sz="3200" u="none">
-          <a:ln>
-            <a:noFill/>
-          </a:ln>
           <a:solidFill>
             <a:srgbClr val="FFFFFF"/>
           </a:solidFill>
@@ -2758,9 +2715,6 @@
         <a:buChar char="•"/>
         <a:tabLst/>
         <a:defRPr b="0" baseline="0" cap="none" i="0" spc="0" strike="noStrike" sz="3200" u="none">
-          <a:ln>
-            <a:noFill/>
-          </a:ln>
           <a:solidFill>
             <a:srgbClr val="FFFFFF"/>
           </a:solidFill>
@@ -2789,9 +2743,6 @@
         <a:buChar char="•"/>
         <a:tabLst/>
         <a:defRPr b="0" baseline="0" cap="none" i="0" spc="0" strike="noStrike" sz="3200" u="none">
-          <a:ln>
-            <a:noFill/>
-          </a:ln>
           <a:solidFill>
             <a:srgbClr val="FFFFFF"/>
           </a:solidFill>
@@ -2820,9 +2771,6 @@
         <a:buNone/>
         <a:tabLst/>
         <a:defRPr b="0" baseline="0" cap="none" i="0" spc="0" strike="noStrike" sz="1600" u="none">
-          <a:ln>
-            <a:noFill/>
-          </a:ln>
           <a:solidFill>
             <a:schemeClr val="tx1"/>
           </a:solidFill>
@@ -2849,9 +2797,6 @@
         <a:buNone/>
         <a:tabLst/>
         <a:defRPr b="0" baseline="0" cap="none" i="0" spc="0" strike="noStrike" sz="1600" u="none">
-          <a:ln>
-            <a:noFill/>
-          </a:ln>
           <a:solidFill>
             <a:schemeClr val="tx1"/>
           </a:solidFill>
@@ -2878,9 +2823,6 @@
         <a:buNone/>
         <a:tabLst/>
         <a:defRPr b="0" baseline="0" cap="none" i="0" spc="0" strike="noStrike" sz="1600" u="none">
-          <a:ln>
-            <a:noFill/>
-          </a:ln>
           <a:solidFill>
             <a:schemeClr val="tx1"/>
           </a:solidFill>
@@ -2907,9 +2849,6 @@
         <a:buNone/>
         <a:tabLst/>
         <a:defRPr b="0" baseline="0" cap="none" i="0" spc="0" strike="noStrike" sz="1600" u="none">
-          <a:ln>
-            <a:noFill/>
-          </a:ln>
           <a:solidFill>
             <a:schemeClr val="tx1"/>
           </a:solidFill>
@@ -2936,9 +2875,6 @@
         <a:buNone/>
         <a:tabLst/>
         <a:defRPr b="0" baseline="0" cap="none" i="0" spc="0" strike="noStrike" sz="1600" u="none">
-          <a:ln>
-            <a:noFill/>
-          </a:ln>
           <a:solidFill>
             <a:schemeClr val="tx1"/>
           </a:solidFill>
@@ -2965,9 +2901,6 @@
         <a:buNone/>
         <a:tabLst/>
         <a:defRPr b="0" baseline="0" cap="none" i="0" spc="0" strike="noStrike" sz="1600" u="none">
-          <a:ln>
-            <a:noFill/>
-          </a:ln>
           <a:solidFill>
             <a:schemeClr val="tx1"/>
           </a:solidFill>
@@ -2994,9 +2927,6 @@
         <a:buNone/>
         <a:tabLst/>
         <a:defRPr b="0" baseline="0" cap="none" i="0" spc="0" strike="noStrike" sz="1600" u="none">
-          <a:ln>
-            <a:noFill/>
-          </a:ln>
           <a:solidFill>
             <a:schemeClr val="tx1"/>
           </a:solidFill>
@@ -3023,9 +2953,6 @@
         <a:buNone/>
         <a:tabLst/>
         <a:defRPr b="0" baseline="0" cap="none" i="0" spc="0" strike="noStrike" sz="1600" u="none">
-          <a:ln>
-            <a:noFill/>
-          </a:ln>
           <a:solidFill>
             <a:schemeClr val="tx1"/>
           </a:solidFill>
@@ -3052,9 +2979,6 @@
         <a:buNone/>
         <a:tabLst/>
         <a:defRPr b="0" baseline="0" cap="none" i="0" spc="0" strike="noStrike" sz="1600" u="none">
-          <a:ln>
-            <a:noFill/>
-          </a:ln>
           <a:solidFill>
             <a:schemeClr val="tx1"/>
           </a:solidFill>
@@ -3071,7 +2995,7 @@
 </file>
 
 <file path=ppt/slides/slide1.xml><?xml version="1.0" encoding="utf-8"?>
-<p:sld xmlns:a="http://schemas.openxmlformats.org/drawingml/2006/main" xmlns:r="http://schemas.openxmlformats.org/officeDocument/2006/relationships" xmlns:p="http://schemas.openxmlformats.org/presentationml/2006/main" showMasterSp="1" showMasterPhAnim="1">
+<p:sld xmlns:a="http://schemas.openxmlformats.org/drawingml/2006/main" xmlns:r="http://schemas.openxmlformats.org/officeDocument/2006/relationships" xmlns:p="http://schemas.openxmlformats.org/presentationml/2006/main" xmlns:m="http://schemas.openxmlformats.org/officeDocument/2006/math" xmlns:a14="http://schemas.microsoft.com/office/drawing/2010/main" showMasterSp="1" showMasterPhAnim="1">
   <p:cSld>
     <p:bg>
       <p:bgPr>
@@ -3144,7 +3068,7 @@
 </file>
 
 <file path=ppt/slides/slide10.xml><?xml version="1.0" encoding="utf-8"?>
-<p:sld xmlns:a="http://schemas.openxmlformats.org/drawingml/2006/main" xmlns:r="http://schemas.openxmlformats.org/officeDocument/2006/relationships" xmlns:p="http://schemas.openxmlformats.org/presentationml/2006/main" showMasterSp="1" showMasterPhAnim="1">
+<p:sld xmlns:a="http://schemas.openxmlformats.org/drawingml/2006/main" xmlns:r="http://schemas.openxmlformats.org/officeDocument/2006/relationships" xmlns:p="http://schemas.openxmlformats.org/presentationml/2006/main" xmlns:m="http://schemas.openxmlformats.org/officeDocument/2006/math" xmlns:a14="http://schemas.microsoft.com/office/drawing/2010/main" showMasterSp="1" showMasterPhAnim="1">
   <p:cSld>
     <p:bg>
       <p:bgPr>
@@ -3212,7 +3136,7 @@
 </file>
 
 <file path=ppt/slides/slide11.xml><?xml version="1.0" encoding="utf-8"?>
-<p:sld xmlns:a="http://schemas.openxmlformats.org/drawingml/2006/main" xmlns:r="http://schemas.openxmlformats.org/officeDocument/2006/relationships" xmlns:p="http://schemas.openxmlformats.org/presentationml/2006/main" showMasterSp="1" showMasterPhAnim="1">
+<p:sld xmlns:a="http://schemas.openxmlformats.org/drawingml/2006/main" xmlns:r="http://schemas.openxmlformats.org/officeDocument/2006/relationships" xmlns:p="http://schemas.openxmlformats.org/presentationml/2006/main" xmlns:m="http://schemas.openxmlformats.org/officeDocument/2006/math" xmlns:a14="http://schemas.microsoft.com/office/drawing/2010/main" showMasterSp="1" showMasterPhAnim="1">
   <p:cSld>
     <p:bg>
       <p:bgPr>
@@ -3314,7 +3238,7 @@
 </file>
 
 <file path=ppt/slides/slide12.xml><?xml version="1.0" encoding="utf-8"?>
-<p:sld xmlns:a="http://schemas.openxmlformats.org/drawingml/2006/main" xmlns:r="http://schemas.openxmlformats.org/officeDocument/2006/relationships" xmlns:p="http://schemas.openxmlformats.org/presentationml/2006/main" showMasterSp="1" showMasterPhAnim="1">
+<p:sld xmlns:a="http://schemas.openxmlformats.org/drawingml/2006/main" xmlns:r="http://schemas.openxmlformats.org/officeDocument/2006/relationships" xmlns:p="http://schemas.openxmlformats.org/presentationml/2006/main" xmlns:m="http://schemas.openxmlformats.org/officeDocument/2006/math" xmlns:a14="http://schemas.microsoft.com/office/drawing/2010/main" showMasterSp="1" showMasterPhAnim="1">
   <p:cSld>
     <p:bg>
       <p:bgPr>
@@ -3542,7 +3466,7 @@
 </file>
 
 <file path=ppt/slides/slide13.xml><?xml version="1.0" encoding="utf-8"?>
-<p:sld xmlns:a="http://schemas.openxmlformats.org/drawingml/2006/main" xmlns:r="http://schemas.openxmlformats.org/officeDocument/2006/relationships" xmlns:p="http://schemas.openxmlformats.org/presentationml/2006/main" showMasterSp="1" showMasterPhAnim="1">
+<p:sld xmlns:a="http://schemas.openxmlformats.org/drawingml/2006/main" xmlns:r="http://schemas.openxmlformats.org/officeDocument/2006/relationships" xmlns:p="http://schemas.openxmlformats.org/presentationml/2006/main" xmlns:m="http://schemas.openxmlformats.org/officeDocument/2006/math" xmlns:a14="http://schemas.microsoft.com/office/drawing/2010/main" showMasterSp="1" showMasterPhAnim="1">
   <p:cSld>
     <p:bg>
       <p:bgPr>
@@ -3615,7 +3539,7 @@
 </file>
 
 <file path=ppt/slides/slide14.xml><?xml version="1.0" encoding="utf-8"?>
-<p:sld xmlns:a="http://schemas.openxmlformats.org/drawingml/2006/main" xmlns:r="http://schemas.openxmlformats.org/officeDocument/2006/relationships" xmlns:p="http://schemas.openxmlformats.org/presentationml/2006/main" showMasterSp="1" showMasterPhAnim="1">
+<p:sld xmlns:a="http://schemas.openxmlformats.org/drawingml/2006/main" xmlns:r="http://schemas.openxmlformats.org/officeDocument/2006/relationships" xmlns:p="http://schemas.openxmlformats.org/presentationml/2006/main" xmlns:m="http://schemas.openxmlformats.org/officeDocument/2006/math" xmlns:a14="http://schemas.microsoft.com/office/drawing/2010/main" showMasterSp="1" showMasterPhAnim="1">
   <p:cSld>
     <p:bg>
       <p:bgPr>
@@ -3688,7 +3612,7 @@
 </file>
 
 <file path=ppt/slides/slide15.xml><?xml version="1.0" encoding="utf-8"?>
-<p:sld xmlns:a="http://schemas.openxmlformats.org/drawingml/2006/main" xmlns:r="http://schemas.openxmlformats.org/officeDocument/2006/relationships" xmlns:p="http://schemas.openxmlformats.org/presentationml/2006/main" showMasterSp="1" showMasterPhAnim="1">
+<p:sld xmlns:a="http://schemas.openxmlformats.org/drawingml/2006/main" xmlns:r="http://schemas.openxmlformats.org/officeDocument/2006/relationships" xmlns:p="http://schemas.openxmlformats.org/presentationml/2006/main" xmlns:m="http://schemas.openxmlformats.org/officeDocument/2006/math" xmlns:a14="http://schemas.microsoft.com/office/drawing/2010/main" showMasterSp="1" showMasterPhAnim="1">
   <p:cSld>
     <p:bg>
       <p:bgPr>
@@ -3761,7 +3685,7 @@
 </file>
 
 <file path=ppt/slides/slide16.xml><?xml version="1.0" encoding="utf-8"?>
-<p:sld xmlns:a="http://schemas.openxmlformats.org/drawingml/2006/main" xmlns:r="http://schemas.openxmlformats.org/officeDocument/2006/relationships" xmlns:p="http://schemas.openxmlformats.org/presentationml/2006/main" showMasterSp="1" showMasterPhAnim="1">
+<p:sld xmlns:a="http://schemas.openxmlformats.org/drawingml/2006/main" xmlns:r="http://schemas.openxmlformats.org/officeDocument/2006/relationships" xmlns:p="http://schemas.openxmlformats.org/presentationml/2006/main" xmlns:m="http://schemas.openxmlformats.org/officeDocument/2006/math" xmlns:a14="http://schemas.microsoft.com/office/drawing/2010/main" showMasterSp="1" showMasterPhAnim="1">
   <p:cSld>
     <p:bg>
       <p:bgPr>
@@ -3834,7 +3758,7 @@
 </file>
 
 <file path=ppt/slides/slide17.xml><?xml version="1.0" encoding="utf-8"?>
-<p:sld xmlns:a="http://schemas.openxmlformats.org/drawingml/2006/main" xmlns:r="http://schemas.openxmlformats.org/officeDocument/2006/relationships" xmlns:p="http://schemas.openxmlformats.org/presentationml/2006/main" showMasterSp="1" showMasterPhAnim="1">
+<p:sld xmlns:a="http://schemas.openxmlformats.org/drawingml/2006/main" xmlns:r="http://schemas.openxmlformats.org/officeDocument/2006/relationships" xmlns:p="http://schemas.openxmlformats.org/presentationml/2006/main" xmlns:m="http://schemas.openxmlformats.org/officeDocument/2006/math" xmlns:a14="http://schemas.microsoft.com/office/drawing/2010/main" showMasterSp="1" showMasterPhAnim="1">
   <p:cSld>
     <p:bg>
       <p:bgPr>
@@ -3907,7 +3831,7 @@
 </file>
 
 <file path=ppt/slides/slide18.xml><?xml version="1.0" encoding="utf-8"?>
-<p:sld xmlns:a="http://schemas.openxmlformats.org/drawingml/2006/main" xmlns:r="http://schemas.openxmlformats.org/officeDocument/2006/relationships" xmlns:p="http://schemas.openxmlformats.org/presentationml/2006/main" showMasterSp="1" showMasterPhAnim="1">
+<p:sld xmlns:a="http://schemas.openxmlformats.org/drawingml/2006/main" xmlns:r="http://schemas.openxmlformats.org/officeDocument/2006/relationships" xmlns:p="http://schemas.openxmlformats.org/presentationml/2006/main" xmlns:m="http://schemas.openxmlformats.org/officeDocument/2006/math" xmlns:a14="http://schemas.microsoft.com/office/drawing/2010/main" showMasterSp="1" showMasterPhAnim="1">
   <p:cSld>
     <p:bg>
       <p:bgPr>
@@ -3980,7 +3904,7 @@
 </file>
 
 <file path=ppt/slides/slide19.xml><?xml version="1.0" encoding="utf-8"?>
-<p:sld xmlns:a="http://schemas.openxmlformats.org/drawingml/2006/main" xmlns:r="http://schemas.openxmlformats.org/officeDocument/2006/relationships" xmlns:p="http://schemas.openxmlformats.org/presentationml/2006/main" showMasterSp="1" showMasterPhAnim="1">
+<p:sld xmlns:a="http://schemas.openxmlformats.org/drawingml/2006/main" xmlns:r="http://schemas.openxmlformats.org/officeDocument/2006/relationships" xmlns:p="http://schemas.openxmlformats.org/presentationml/2006/main" xmlns:m="http://schemas.openxmlformats.org/officeDocument/2006/math" xmlns:a14="http://schemas.microsoft.com/office/drawing/2010/main" showMasterSp="1" showMasterPhAnim="1">
   <p:cSld>
     <p:bg>
       <p:bgPr>
@@ -4115,7 +4039,7 @@
 </file>
 
 <file path=ppt/slides/slide2.xml><?xml version="1.0" encoding="utf-8"?>
-<p:sld xmlns:a="http://schemas.openxmlformats.org/drawingml/2006/main" xmlns:r="http://schemas.openxmlformats.org/officeDocument/2006/relationships" xmlns:p="http://schemas.openxmlformats.org/presentationml/2006/main" showMasterSp="1" showMasterPhAnim="1">
+<p:sld xmlns:a="http://schemas.openxmlformats.org/drawingml/2006/main" xmlns:r="http://schemas.openxmlformats.org/officeDocument/2006/relationships" xmlns:p="http://schemas.openxmlformats.org/presentationml/2006/main" xmlns:m="http://schemas.openxmlformats.org/officeDocument/2006/math" xmlns:a14="http://schemas.microsoft.com/office/drawing/2010/main" showMasterSp="1" showMasterPhAnim="1">
   <p:cSld>
     <p:bg>
       <p:bgPr>
@@ -4195,7 +4119,7 @@
 </file>
 
 <file path=ppt/slides/slide20.xml><?xml version="1.0" encoding="utf-8"?>
-<p:sld xmlns:a="http://schemas.openxmlformats.org/drawingml/2006/main" xmlns:r="http://schemas.openxmlformats.org/officeDocument/2006/relationships" xmlns:p="http://schemas.openxmlformats.org/presentationml/2006/main" showMasterSp="1" showMasterPhAnim="1">
+<p:sld xmlns:a="http://schemas.openxmlformats.org/drawingml/2006/main" xmlns:r="http://schemas.openxmlformats.org/officeDocument/2006/relationships" xmlns:p="http://schemas.openxmlformats.org/presentationml/2006/main" xmlns:m="http://schemas.openxmlformats.org/officeDocument/2006/math" xmlns:a14="http://schemas.microsoft.com/office/drawing/2010/main" showMasterSp="1" showMasterPhAnim="1">
   <p:cSld>
     <p:bg>
       <p:bgPr>
@@ -4316,7 +4240,7 @@
 </file>
 
 <file path=ppt/slides/slide21.xml><?xml version="1.0" encoding="utf-8"?>
-<p:sld xmlns:a="http://schemas.openxmlformats.org/drawingml/2006/main" xmlns:r="http://schemas.openxmlformats.org/officeDocument/2006/relationships" xmlns:p="http://schemas.openxmlformats.org/presentationml/2006/main" showMasterSp="1" showMasterPhAnim="1">
+<p:sld xmlns:a="http://schemas.openxmlformats.org/drawingml/2006/main" xmlns:r="http://schemas.openxmlformats.org/officeDocument/2006/relationships" xmlns:p="http://schemas.openxmlformats.org/presentationml/2006/main" xmlns:m="http://schemas.openxmlformats.org/officeDocument/2006/math" xmlns:a14="http://schemas.microsoft.com/office/drawing/2010/main" showMasterSp="1" showMasterPhAnim="1">
   <p:cSld>
     <p:bg>
       <p:bgPr>
@@ -4437,7 +4361,7 @@
 </file>
 
 <file path=ppt/slides/slide22.xml><?xml version="1.0" encoding="utf-8"?>
-<p:sld xmlns:a="http://schemas.openxmlformats.org/drawingml/2006/main" xmlns:r="http://schemas.openxmlformats.org/officeDocument/2006/relationships" xmlns:p="http://schemas.openxmlformats.org/presentationml/2006/main" showMasterSp="1" showMasterPhAnim="1">
+<p:sld xmlns:a="http://schemas.openxmlformats.org/drawingml/2006/main" xmlns:r="http://schemas.openxmlformats.org/officeDocument/2006/relationships" xmlns:p="http://schemas.openxmlformats.org/presentationml/2006/main" xmlns:m="http://schemas.openxmlformats.org/officeDocument/2006/math" xmlns:a14="http://schemas.microsoft.com/office/drawing/2010/main" showMasterSp="1" showMasterPhAnim="1">
   <p:cSld>
     <p:bg>
       <p:bgPr>
@@ -4585,7 +4509,7 @@
 </file>
 
 <file path=ppt/slides/slide23.xml><?xml version="1.0" encoding="utf-8"?>
-<p:sld xmlns:a="http://schemas.openxmlformats.org/drawingml/2006/main" xmlns:r="http://schemas.openxmlformats.org/officeDocument/2006/relationships" xmlns:p="http://schemas.openxmlformats.org/presentationml/2006/main" showMasterSp="1" showMasterPhAnim="1">
+<p:sld xmlns:a="http://schemas.openxmlformats.org/drawingml/2006/main" xmlns:r="http://schemas.openxmlformats.org/officeDocument/2006/relationships" xmlns:p="http://schemas.openxmlformats.org/presentationml/2006/main" xmlns:m="http://schemas.openxmlformats.org/officeDocument/2006/math" xmlns:a14="http://schemas.microsoft.com/office/drawing/2010/main" showMasterSp="1" showMasterPhAnim="1">
   <p:cSld>
     <p:bg>
       <p:bgPr>
@@ -4653,7 +4577,7 @@
 </file>
 
 <file path=ppt/slides/slide24.xml><?xml version="1.0" encoding="utf-8"?>
-<p:sld xmlns:a="http://schemas.openxmlformats.org/drawingml/2006/main" xmlns:r="http://schemas.openxmlformats.org/officeDocument/2006/relationships" xmlns:p="http://schemas.openxmlformats.org/presentationml/2006/main" showMasterSp="1" showMasterPhAnim="1">
+<p:sld xmlns:a="http://schemas.openxmlformats.org/drawingml/2006/main" xmlns:r="http://schemas.openxmlformats.org/officeDocument/2006/relationships" xmlns:p="http://schemas.openxmlformats.org/presentationml/2006/main" xmlns:m="http://schemas.openxmlformats.org/officeDocument/2006/math" xmlns:a14="http://schemas.microsoft.com/office/drawing/2010/main" showMasterSp="1" showMasterPhAnim="1">
   <p:cSld>
     <p:bg>
       <p:bgPr>
@@ -4728,7 +4652,7 @@
 </file>
 
 <file path=ppt/slides/slide25.xml><?xml version="1.0" encoding="utf-8"?>
-<p:sld xmlns:a="http://schemas.openxmlformats.org/drawingml/2006/main" xmlns:r="http://schemas.openxmlformats.org/officeDocument/2006/relationships" xmlns:p="http://schemas.openxmlformats.org/presentationml/2006/main" showMasterSp="1" showMasterPhAnim="1">
+<p:sld xmlns:a="http://schemas.openxmlformats.org/drawingml/2006/main" xmlns:r="http://schemas.openxmlformats.org/officeDocument/2006/relationships" xmlns:p="http://schemas.openxmlformats.org/presentationml/2006/main" xmlns:m="http://schemas.openxmlformats.org/officeDocument/2006/math" xmlns:a14="http://schemas.microsoft.com/office/drawing/2010/main" showMasterSp="1" showMasterPhAnim="1">
   <p:cSld>
     <p:bg>
       <p:bgPr>
@@ -4796,7 +4720,7 @@
 </file>
 
 <file path=ppt/slides/slide26.xml><?xml version="1.0" encoding="utf-8"?>
-<p:sld xmlns:a="http://schemas.openxmlformats.org/drawingml/2006/main" xmlns:r="http://schemas.openxmlformats.org/officeDocument/2006/relationships" xmlns:p="http://schemas.openxmlformats.org/presentationml/2006/main" showMasterSp="1" showMasterPhAnim="1">
+<p:sld xmlns:a="http://schemas.openxmlformats.org/drawingml/2006/main" xmlns:r="http://schemas.openxmlformats.org/officeDocument/2006/relationships" xmlns:p="http://schemas.openxmlformats.org/presentationml/2006/main" xmlns:m="http://schemas.openxmlformats.org/officeDocument/2006/math" xmlns:a14="http://schemas.microsoft.com/office/drawing/2010/main" showMasterSp="1" showMasterPhAnim="1">
   <p:cSld>
     <p:bg>
       <p:bgPr>
@@ -4871,7 +4795,7 @@
 </file>
 
 <file path=ppt/slides/slide27.xml><?xml version="1.0" encoding="utf-8"?>
-<p:sld xmlns:a="http://schemas.openxmlformats.org/drawingml/2006/main" xmlns:r="http://schemas.openxmlformats.org/officeDocument/2006/relationships" xmlns:p="http://schemas.openxmlformats.org/presentationml/2006/main" showMasterSp="1" showMasterPhAnim="1">
+<p:sld xmlns:a="http://schemas.openxmlformats.org/drawingml/2006/main" xmlns:r="http://schemas.openxmlformats.org/officeDocument/2006/relationships" xmlns:p="http://schemas.openxmlformats.org/presentationml/2006/main" xmlns:m="http://schemas.openxmlformats.org/officeDocument/2006/math" xmlns:a14="http://schemas.microsoft.com/office/drawing/2010/main" showMasterSp="1" showMasterPhAnim="1">
   <p:cSld>
     <p:bg>
       <p:bgPr>
@@ -4939,7 +4863,7 @@
 </file>
 
 <file path=ppt/slides/slide28.xml><?xml version="1.0" encoding="utf-8"?>
-<p:sld xmlns:a="http://schemas.openxmlformats.org/drawingml/2006/main" xmlns:r="http://schemas.openxmlformats.org/officeDocument/2006/relationships" xmlns:p="http://schemas.openxmlformats.org/presentationml/2006/main" showMasterSp="1" showMasterPhAnim="1">
+<p:sld xmlns:a="http://schemas.openxmlformats.org/drawingml/2006/main" xmlns:r="http://schemas.openxmlformats.org/officeDocument/2006/relationships" xmlns:p="http://schemas.openxmlformats.org/presentationml/2006/main" xmlns:m="http://schemas.openxmlformats.org/officeDocument/2006/math" xmlns:a14="http://schemas.microsoft.com/office/drawing/2010/main" showMasterSp="1" showMasterPhAnim="1">
   <p:cSld>
     <p:bg>
       <p:bgPr>
@@ -5014,7 +4938,7 @@
 </file>
 
 <file path=ppt/slides/slide29.xml><?xml version="1.0" encoding="utf-8"?>
-<p:sld xmlns:a="http://schemas.openxmlformats.org/drawingml/2006/main" xmlns:r="http://schemas.openxmlformats.org/officeDocument/2006/relationships" xmlns:p="http://schemas.openxmlformats.org/presentationml/2006/main" showMasterSp="1" showMasterPhAnim="1">
+<p:sld xmlns:a="http://schemas.openxmlformats.org/drawingml/2006/main" xmlns:r="http://schemas.openxmlformats.org/officeDocument/2006/relationships" xmlns:p="http://schemas.openxmlformats.org/presentationml/2006/main" xmlns:m="http://schemas.openxmlformats.org/officeDocument/2006/math" xmlns:a14="http://schemas.microsoft.com/office/drawing/2010/main" showMasterSp="1" showMasterPhAnim="1">
   <p:cSld>
     <p:bg>
       <p:bgPr>
@@ -5082,7 +5006,7 @@
 </file>
 
 <file path=ppt/slides/slide3.xml><?xml version="1.0" encoding="utf-8"?>
-<p:sld xmlns:a="http://schemas.openxmlformats.org/drawingml/2006/main" xmlns:r="http://schemas.openxmlformats.org/officeDocument/2006/relationships" xmlns:p="http://schemas.openxmlformats.org/presentationml/2006/main" showMasterSp="1" showMasterPhAnim="1">
+<p:sld xmlns:a="http://schemas.openxmlformats.org/drawingml/2006/main" xmlns:r="http://schemas.openxmlformats.org/officeDocument/2006/relationships" xmlns:p="http://schemas.openxmlformats.org/presentationml/2006/main" xmlns:m="http://schemas.openxmlformats.org/officeDocument/2006/math" xmlns:a14="http://schemas.microsoft.com/office/drawing/2010/main" showMasterSp="1" showMasterPhAnim="1">
   <p:cSld>
     <p:bg>
       <p:bgPr>
@@ -5182,7 +5106,7 @@
 </file>
 
 <file path=ppt/slides/slide30.xml><?xml version="1.0" encoding="utf-8"?>
-<p:sld xmlns:a="http://schemas.openxmlformats.org/drawingml/2006/main" xmlns:r="http://schemas.openxmlformats.org/officeDocument/2006/relationships" xmlns:p="http://schemas.openxmlformats.org/presentationml/2006/main" showMasterSp="1" showMasterPhAnim="1">
+<p:sld xmlns:a="http://schemas.openxmlformats.org/drawingml/2006/main" xmlns:r="http://schemas.openxmlformats.org/officeDocument/2006/relationships" xmlns:p="http://schemas.openxmlformats.org/presentationml/2006/main" xmlns:m="http://schemas.openxmlformats.org/officeDocument/2006/math" xmlns:a14="http://schemas.microsoft.com/office/drawing/2010/main" showMasterSp="1" showMasterPhAnim="1">
   <p:cSld>
     <p:bg>
       <p:bgPr>
@@ -5269,7 +5193,7 @@
 </file>
 
 <file path=ppt/slides/slide31.xml><?xml version="1.0" encoding="utf-8"?>
-<p:sld xmlns:a="http://schemas.openxmlformats.org/drawingml/2006/main" xmlns:r="http://schemas.openxmlformats.org/officeDocument/2006/relationships" xmlns:p="http://schemas.openxmlformats.org/presentationml/2006/main" showMasterSp="1" showMasterPhAnim="1">
+<p:sld xmlns:a="http://schemas.openxmlformats.org/drawingml/2006/main" xmlns:r="http://schemas.openxmlformats.org/officeDocument/2006/relationships" xmlns:p="http://schemas.openxmlformats.org/presentationml/2006/main" xmlns:m="http://schemas.openxmlformats.org/officeDocument/2006/math" xmlns:a14="http://schemas.microsoft.com/office/drawing/2010/main" showMasterSp="1" showMasterPhAnim="1">
   <p:cSld>
     <p:bg>
       <p:bgPr>
@@ -5294,34 +5218,26 @@
       </p:grpSpPr>
       <p:sp>
         <p:nvSpPr>
-          <p:cNvPr id="184" name="We would love to share your excitement and news at becoming a speaker!"/>
+          <p:cNvPr id="184" name="Before you go…"/>
           <p:cNvSpPr txBox="1"/>
-          <p:nvPr/>
+          <p:nvPr>
+            <p:ph type="ctrTitle"/>
+          </p:nvPr>
         </p:nvSpPr>
         <p:spPr>
           <a:xfrm>
-            <a:off x="897135" y="2531516"/>
-            <a:ext cx="11210530" cy="1515568"/>
+            <a:off x="897135" y="3524746"/>
+            <a:ext cx="11210530" cy="2704108"/>
           </a:xfrm>
           <a:prstGeom prst="rect">
             <a:avLst/>
           </a:prstGeom>
-          <a:ln w="12700">
-            <a:miter lim="400000"/>
-          </a:ln>
-          <a:extLst>
-            <a:ext uri="{C572A759-6A51-4108-AA02-DFA0A04FC94B}">
-              <ma14:wrappingTextBoxFlag xmlns:ma14="http://schemas.microsoft.com/office/mac/drawingml/2011/main" val="1"/>
-            </a:ext>
-          </a:extLst>
         </p:spPr>
         <p:txBody>
-          <a:bodyPr lIns="50800" tIns="50800" rIns="50800" bIns="50800" anchor="b">
-            <a:normAutofit fontScale="100000" lnSpcReduction="0"/>
-          </a:bodyPr>
+          <a:bodyPr/>
           <a:lstStyle>
-            <a:lvl1pPr defTabSz="297941">
-              <a:defRPr b="0" sz="4080">
+            <a:lvl1pPr>
+              <a:defRPr sz="8400">
                 <a:solidFill>
                   <a:srgbClr val="000000"/>
                 </a:solidFill>
@@ -5335,55 +5251,7 @@
           <a:p>
             <a:pPr/>
             <a:r>
-              <a:t>We would love to share your excitement and news at becoming a speaker!</a:t>
-            </a:r>
-          </a:p>
-        </p:txBody>
-      </p:sp>
-      <p:sp>
-        <p:nvSpPr>
-          <p:cNvPr id="185" name="https://www.globaldiversitycfpday.com/celebrate"/>
-          <p:cNvSpPr txBox="1"/>
-          <p:nvPr/>
-        </p:nvSpPr>
-        <p:spPr>
-          <a:xfrm>
-            <a:off x="897135" y="4842916"/>
-            <a:ext cx="11210530" cy="1515568"/>
-          </a:xfrm>
-          <a:prstGeom prst="rect">
-            <a:avLst/>
-          </a:prstGeom>
-          <a:ln w="12700">
-            <a:miter lim="400000"/>
-          </a:ln>
-          <a:extLst>
-            <a:ext uri="{C572A759-6A51-4108-AA02-DFA0A04FC94B}">
-              <ma14:wrappingTextBoxFlag xmlns:ma14="http://schemas.microsoft.com/office/mac/drawingml/2011/main" val="1"/>
-            </a:ext>
-          </a:extLst>
-        </p:spPr>
-        <p:txBody>
-          <a:bodyPr lIns="50800" tIns="50800" rIns="50800" bIns="50800" anchor="b">
-            <a:normAutofit fontScale="100000" lnSpcReduction="0"/>
-          </a:bodyPr>
-          <a:lstStyle>
-            <a:lvl1pPr>
-              <a:defRPr b="0" sz="3300">
-                <a:solidFill>
-                  <a:srgbClr val="000000"/>
-                </a:solidFill>
-                <a:latin typeface="Comfortaa Bold"/>
-                <a:ea typeface="Comfortaa Bold"/>
-                <a:cs typeface="Comfortaa Bold"/>
-                <a:sym typeface="Comfortaa Bold"/>
-              </a:defRPr>
-            </a:lvl1pPr>
-          </a:lstStyle>
-          <a:p>
-            <a:pPr/>
-            <a:r>
-              <a:t>https://www.globaldiversitycfpday.com/celebrate</a:t>
+              <a:t>Before you go…</a:t>
             </a:r>
           </a:p>
         </p:txBody>
@@ -5398,7 +5266,489 @@
 </file>
 
 <file path=ppt/slides/slide32.xml><?xml version="1.0" encoding="utf-8"?>
-<p:sld xmlns:a="http://schemas.openxmlformats.org/drawingml/2006/main" xmlns:r="http://schemas.openxmlformats.org/officeDocument/2006/relationships" xmlns:p="http://schemas.openxmlformats.org/presentationml/2006/main" showMasterSp="1" showMasterPhAnim="1">
+<p:sld xmlns:a="http://schemas.openxmlformats.org/drawingml/2006/main" xmlns:r="http://schemas.openxmlformats.org/officeDocument/2006/relationships" xmlns:p="http://schemas.openxmlformats.org/presentationml/2006/main" xmlns:m="http://schemas.openxmlformats.org/officeDocument/2006/math" xmlns:a14="http://schemas.microsoft.com/office/drawing/2010/main" showMasterSp="1" showMasterPhAnim="1">
+  <p:cSld>
+    <p:bg>
+      <p:bgPr>
+        <a:solidFill>
+          <a:srgbClr val="FFFF92"/>
+        </a:solidFill>
+      </p:bgPr>
+    </p:bg>
+    <p:spTree>
+      <p:nvGrpSpPr>
+        <p:cNvPr id="1" name=""/>
+        <p:cNvGrpSpPr/>
+        <p:nvPr/>
+      </p:nvGrpSpPr>
+      <p:grpSpPr>
+        <a:xfrm>
+          <a:off x="0" y="0"/>
+          <a:ext cx="0" cy="0"/>
+          <a:chOff x="0" y="0"/>
+          <a:chExt cx="0" cy="0"/>
+        </a:xfrm>
+      </p:grpSpPr>
+      <p:pic>
+        <p:nvPicPr>
+          <p:cNvPr id="186" name="queerjs.png" descr="queerjs.png"/>
+          <p:cNvPicPr>
+            <a:picLocks noChangeAspect="1"/>
+          </p:cNvPicPr>
+          <p:nvPr/>
+        </p:nvPicPr>
+        <p:blipFill>
+          <a:blip r:embed="rId2">
+            <a:extLst/>
+          </a:blip>
+          <a:stretch>
+            <a:fillRect/>
+          </a:stretch>
+        </p:blipFill>
+        <p:spPr>
+          <a:xfrm>
+            <a:off x="3538301" y="652611"/>
+            <a:ext cx="5928198" cy="5928197"/>
+          </a:xfrm>
+          <a:prstGeom prst="rect">
+            <a:avLst/>
+          </a:prstGeom>
+          <a:ln w="12700">
+            <a:miter lim="400000"/>
+          </a:ln>
+        </p:spPr>
+      </p:pic>
+      <p:sp>
+        <p:nvSpPr>
+          <p:cNvPr id="187" name="@QueerJS meetups would ❤️ to have you speak at one of their future events"/>
+          <p:cNvSpPr txBox="1"/>
+          <p:nvPr>
+            <p:ph type="ctrTitle"/>
+          </p:nvPr>
+        </p:nvSpPr>
+        <p:spPr>
+          <a:xfrm>
+            <a:off x="897135" y="6827589"/>
+            <a:ext cx="11210530" cy="1636465"/>
+          </a:xfrm>
+          <a:prstGeom prst="rect">
+            <a:avLst/>
+          </a:prstGeom>
+        </p:spPr>
+        <p:txBody>
+          <a:bodyPr/>
+          <a:lstStyle>
+            <a:lvl1pPr defTabSz="297941">
+              <a:defRPr sz="4284">
+                <a:solidFill>
+                  <a:srgbClr val="000000"/>
+                </a:solidFill>
+                <a:latin typeface="Comfortaa Bold"/>
+                <a:ea typeface="Comfortaa Bold"/>
+                <a:cs typeface="Comfortaa Bold"/>
+                <a:sym typeface="Comfortaa Bold"/>
+              </a:defRPr>
+            </a:lvl1pPr>
+          </a:lstStyle>
+          <a:p>
+            <a:pPr/>
+            <a:r>
+              <a:t>@QueerJS meetups would ❤️ to have you speak at one of their future events</a:t>
+            </a:r>
+          </a:p>
+        </p:txBody>
+      </p:sp>
+    </p:spTree>
+  </p:cSld>
+  <p:clrMapOvr>
+    <a:masterClrMapping/>
+  </p:clrMapOvr>
+  <p:transition xmlns:p14="http://schemas.microsoft.com/office/powerpoint/2010/main" spd="med" advClick="1"/>
+</p:sld>
+</file>
+
+<file path=ppt/slides/slide33.xml><?xml version="1.0" encoding="utf-8"?>
+<p:sld xmlns:a="http://schemas.openxmlformats.org/drawingml/2006/main" xmlns:r="http://schemas.openxmlformats.org/officeDocument/2006/relationships" xmlns:p="http://schemas.openxmlformats.org/presentationml/2006/main" xmlns:m="http://schemas.openxmlformats.org/officeDocument/2006/math" xmlns:a14="http://schemas.microsoft.com/office/drawing/2010/main" showMasterSp="1" showMasterPhAnim="1">
+  <p:cSld>
+    <p:bg>
+      <p:bgPr>
+        <a:solidFill>
+          <a:srgbClr val="FFFF92"/>
+        </a:solidFill>
+      </p:bgPr>
+    </p:bg>
+    <p:spTree>
+      <p:nvGrpSpPr>
+        <p:cNvPr id="1" name=""/>
+        <p:cNvGrpSpPr/>
+        <p:nvPr/>
+      </p:nvGrpSpPr>
+      <p:grpSpPr>
+        <a:xfrm>
+          <a:off x="0" y="0"/>
+          <a:ext cx="0" cy="0"/>
+          <a:chOff x="0" y="0"/>
+          <a:chExt cx="0" cy="0"/>
+        </a:xfrm>
+      </p:grpSpPr>
+      <p:pic>
+        <p:nvPicPr>
+          <p:cNvPr id="189" name="queerjs.png" descr="queerjs.png"/>
+          <p:cNvPicPr>
+            <a:picLocks noChangeAspect="1"/>
+          </p:cNvPicPr>
+          <p:nvPr/>
+        </p:nvPicPr>
+        <p:blipFill>
+          <a:blip r:embed="rId2">
+            <a:extLst/>
+          </a:blip>
+          <a:stretch>
+            <a:fillRect/>
+          </a:stretch>
+        </p:blipFill>
+        <p:spPr>
+          <a:xfrm>
+            <a:off x="10002601" y="1630511"/>
+            <a:ext cx="1748856" cy="1748855"/>
+          </a:xfrm>
+          <a:prstGeom prst="rect">
+            <a:avLst/>
+          </a:prstGeom>
+          <a:ln w="12700">
+            <a:miter lim="400000"/>
+          </a:ln>
+        </p:spPr>
+      </p:pic>
+      <p:sp>
+        <p:nvSpPr>
+          <p:cNvPr id="190" name="Everyone is welcome to attend QueerJS and all speakers are queer.…"/>
+          <p:cNvSpPr txBox="1"/>
+          <p:nvPr>
+            <p:ph type="ctrTitle"/>
+          </p:nvPr>
+        </p:nvSpPr>
+        <p:spPr>
+          <a:xfrm>
+            <a:off x="897135" y="4274889"/>
+            <a:ext cx="10921208" cy="5089328"/>
+          </a:xfrm>
+          <a:prstGeom prst="rect">
+            <a:avLst/>
+          </a:prstGeom>
+        </p:spPr>
+        <p:txBody>
+          <a:bodyPr/>
+          <a:lstStyle/>
+          <a:p>
+            <a:pPr algn="l" defTabSz="251206">
+              <a:defRPr sz="3612">
+                <a:solidFill>
+                  <a:srgbClr val="000000"/>
+                </a:solidFill>
+                <a:latin typeface="Comfortaa Bold"/>
+                <a:ea typeface="Comfortaa Bold"/>
+                <a:cs typeface="Comfortaa Bold"/>
+                <a:sym typeface="Comfortaa Bold"/>
+              </a:defRPr>
+            </a:pPr>
+            <a:r>
+              <a:t>Everyone is welcome to attend QueerJS and all speakers are queer.</a:t>
+            </a:r>
+          </a:p>
+          <a:p>
+            <a:pPr algn="l" defTabSz="251206">
+              <a:defRPr sz="3612">
+                <a:solidFill>
+                  <a:srgbClr val="000000"/>
+                </a:solidFill>
+                <a:latin typeface="Comfortaa Bold"/>
+                <a:ea typeface="Comfortaa Bold"/>
+                <a:cs typeface="Comfortaa Bold"/>
+                <a:sym typeface="Comfortaa Bold"/>
+              </a:defRPr>
+            </a:pPr>
+          </a:p>
+          <a:p>
+            <a:pPr algn="l" defTabSz="251206">
+              <a:defRPr sz="3612">
+                <a:solidFill>
+                  <a:srgbClr val="000000"/>
+                </a:solidFill>
+                <a:latin typeface="Comfortaa Bold"/>
+                <a:ea typeface="Comfortaa Bold"/>
+                <a:cs typeface="Comfortaa Bold"/>
+                <a:sym typeface="Comfortaa Bold"/>
+              </a:defRPr>
+            </a:pPr>
+            <a:r>
+              <a:t>Technical &amp; non-technical talks are welcome.</a:t>
+            </a:r>
+          </a:p>
+          <a:p>
+            <a:pPr algn="l" defTabSz="251206">
+              <a:defRPr sz="3612">
+                <a:solidFill>
+                  <a:srgbClr val="000000"/>
+                </a:solidFill>
+                <a:latin typeface="Comfortaa Bold"/>
+                <a:ea typeface="Comfortaa Bold"/>
+                <a:cs typeface="Comfortaa Bold"/>
+                <a:sym typeface="Comfortaa Bold"/>
+              </a:defRPr>
+            </a:pPr>
+          </a:p>
+          <a:p>
+            <a:pPr algn="l" defTabSz="251206">
+              <a:defRPr sz="3612">
+                <a:solidFill>
+                  <a:srgbClr val="000000"/>
+                </a:solidFill>
+                <a:latin typeface="Comfortaa Bold"/>
+                <a:ea typeface="Comfortaa Bold"/>
+                <a:cs typeface="Comfortaa Bold"/>
+                <a:sym typeface="Comfortaa Bold"/>
+              </a:defRPr>
+            </a:pPr>
+            <a:r>
+              <a:t>Apply now at </a:t>
+            </a:r>
+            <a:r>
+              <a:rPr u="sng">
+                <a:hlinkClick r:id="rId3" invalidUrl="" action="" tgtFrame="" tooltip="" history="1" highlightClick="0" endSnd="0"/>
+              </a:rPr>
+              <a:t>https://queerjs.com/</a:t>
+            </a:r>
+          </a:p>
+          <a:p>
+            <a:pPr algn="l" defTabSz="251206">
+              <a:defRPr sz="3612">
+                <a:solidFill>
+                  <a:srgbClr val="000000"/>
+                </a:solidFill>
+                <a:latin typeface="Comfortaa Bold"/>
+                <a:ea typeface="Comfortaa Bold"/>
+                <a:cs typeface="Comfortaa Bold"/>
+                <a:sym typeface="Comfortaa Bold"/>
+              </a:defRPr>
+            </a:pPr>
+          </a:p>
+        </p:txBody>
+      </p:sp>
+    </p:spTree>
+  </p:cSld>
+  <p:clrMapOvr>
+    <a:masterClrMapping/>
+  </p:clrMapOvr>
+  <p:transition xmlns:p14="http://schemas.microsoft.com/office/powerpoint/2010/main" spd="med" advClick="1"/>
+</p:sld>
+</file>
+
+<file path=ppt/slides/slide34.xml><?xml version="1.0" encoding="utf-8"?>
+<p:sld xmlns:a="http://schemas.openxmlformats.org/drawingml/2006/main" xmlns:r="http://schemas.openxmlformats.org/officeDocument/2006/relationships" xmlns:p="http://schemas.openxmlformats.org/presentationml/2006/main" xmlns:m="http://schemas.openxmlformats.org/officeDocument/2006/math" xmlns:a14="http://schemas.microsoft.com/office/drawing/2010/main" showMasterSp="1" showMasterPhAnim="1">
+  <p:cSld>
+    <p:bg>
+      <p:bgPr>
+        <a:solidFill>
+          <a:srgbClr val="FFFF92"/>
+        </a:solidFill>
+      </p:bgPr>
+    </p:bg>
+    <p:spTree>
+      <p:nvGrpSpPr>
+        <p:cNvPr id="1" name=""/>
+        <p:cNvGrpSpPr/>
+        <p:nvPr/>
+      </p:nvGrpSpPr>
+      <p:grpSpPr>
+        <a:xfrm>
+          <a:off x="0" y="0"/>
+          <a:ext cx="0" cy="0"/>
+          <a:chOff x="0" y="0"/>
+          <a:chExt cx="0" cy="0"/>
+        </a:xfrm>
+      </p:grpSpPr>
+      <p:pic>
+        <p:nvPicPr>
+          <p:cNvPr id="192" name="queerjs.png" descr="queerjs.png"/>
+          <p:cNvPicPr>
+            <a:picLocks noChangeAspect="1"/>
+          </p:cNvPicPr>
+          <p:nvPr/>
+        </p:nvPicPr>
+        <p:blipFill>
+          <a:blip r:embed="rId2">
+            <a:extLst/>
+          </a:blip>
+          <a:stretch>
+            <a:fillRect/>
+          </a:stretch>
+        </p:blipFill>
+        <p:spPr>
+          <a:xfrm>
+            <a:off x="10002601" y="1630511"/>
+            <a:ext cx="1748856" cy="1748855"/>
+          </a:xfrm>
+          <a:prstGeom prst="rect">
+            <a:avLst/>
+          </a:prstGeom>
+          <a:ln w="12700">
+            <a:miter lim="400000"/>
+          </a:ln>
+        </p:spPr>
+      </p:pic>
+      <p:sp>
+        <p:nvSpPr>
+          <p:cNvPr id="193" name="No QueerJS meetup in your location? Why not organise one?…"/>
+          <p:cNvSpPr txBox="1"/>
+          <p:nvPr>
+            <p:ph type="ctrTitle"/>
+          </p:nvPr>
+        </p:nvSpPr>
+        <p:spPr>
+          <a:xfrm>
+            <a:off x="884435" y="3429198"/>
+            <a:ext cx="10921208" cy="5985819"/>
+          </a:xfrm>
+          <a:prstGeom prst="rect">
+            <a:avLst/>
+          </a:prstGeom>
+        </p:spPr>
+        <p:txBody>
+          <a:bodyPr/>
+          <a:lstStyle/>
+          <a:p>
+            <a:pPr algn="l" defTabSz="233679">
+              <a:defRPr sz="3360">
+                <a:solidFill>
+                  <a:srgbClr val="000000"/>
+                </a:solidFill>
+                <a:latin typeface="Comfortaa Bold"/>
+                <a:ea typeface="Comfortaa Bold"/>
+                <a:cs typeface="Comfortaa Bold"/>
+                <a:sym typeface="Comfortaa Bold"/>
+              </a:defRPr>
+            </a:pPr>
+            <a:r>
+              <a:t>No QueerJS meetup in your location? Why not organise one?</a:t>
+            </a:r>
+          </a:p>
+          <a:p>
+            <a:pPr algn="l" defTabSz="233679">
+              <a:defRPr sz="3360">
+                <a:solidFill>
+                  <a:srgbClr val="000000"/>
+                </a:solidFill>
+                <a:latin typeface="Comfortaa Bold"/>
+                <a:ea typeface="Comfortaa Bold"/>
+                <a:cs typeface="Comfortaa Bold"/>
+                <a:sym typeface="Comfortaa Bold"/>
+              </a:defRPr>
+            </a:pPr>
+          </a:p>
+          <a:p>
+            <a:pPr algn="l" defTabSz="233679">
+              <a:defRPr sz="3360">
+                <a:solidFill>
+                  <a:srgbClr val="000000"/>
+                </a:solidFill>
+                <a:latin typeface="Comfortaa Bold"/>
+                <a:ea typeface="Comfortaa Bold"/>
+                <a:cs typeface="Comfortaa Bold"/>
+                <a:sym typeface="Comfortaa Bold"/>
+              </a:defRPr>
+            </a:pPr>
+            <a:r>
+              <a:t>The meetup has to be FREE!</a:t>
+            </a:r>
+          </a:p>
+          <a:p>
+            <a:pPr algn="l" defTabSz="233679">
+              <a:defRPr sz="3360">
+                <a:solidFill>
+                  <a:srgbClr val="000000"/>
+                </a:solidFill>
+                <a:latin typeface="Comfortaa Bold"/>
+                <a:ea typeface="Comfortaa Bold"/>
+                <a:cs typeface="Comfortaa Bold"/>
+                <a:sym typeface="Comfortaa Bold"/>
+              </a:defRPr>
+            </a:pPr>
+            <a:r>
+              <a:t>Speaker travel support is provided up to 200 Euros.</a:t>
+            </a:r>
+          </a:p>
+          <a:p>
+            <a:pPr algn="l" defTabSz="233679">
+              <a:defRPr sz="3360">
+                <a:solidFill>
+                  <a:srgbClr val="000000"/>
+                </a:solidFill>
+                <a:latin typeface="Comfortaa Bold"/>
+                <a:ea typeface="Comfortaa Bold"/>
+                <a:cs typeface="Comfortaa Bold"/>
+                <a:sym typeface="Comfortaa Bold"/>
+              </a:defRPr>
+            </a:pPr>
+          </a:p>
+          <a:p>
+            <a:pPr algn="l" defTabSz="233679">
+              <a:defRPr sz="3360">
+                <a:solidFill>
+                  <a:srgbClr val="000000"/>
+                </a:solidFill>
+                <a:latin typeface="Comfortaa Bold"/>
+                <a:ea typeface="Comfortaa Bold"/>
+                <a:cs typeface="Comfortaa Bold"/>
+                <a:sym typeface="Comfortaa Bold"/>
+              </a:defRPr>
+            </a:pPr>
+            <a:r>
+              <a:t>Get in touch via Discord: </a:t>
+            </a:r>
+          </a:p>
+          <a:p>
+            <a:pPr algn="l" defTabSz="233679">
+              <a:defRPr sz="3360">
+                <a:solidFill>
+                  <a:srgbClr val="000000"/>
+                </a:solidFill>
+                <a:latin typeface="Comfortaa Bold"/>
+                <a:ea typeface="Comfortaa Bold"/>
+                <a:cs typeface="Comfortaa Bold"/>
+                <a:sym typeface="Comfortaa Bold"/>
+              </a:defRPr>
+            </a:pPr>
+            <a:r>
+              <a:t>https://discord.gg/kaevuK</a:t>
+            </a:r>
+          </a:p>
+          <a:p>
+            <a:pPr algn="l" defTabSz="233679">
+              <a:defRPr sz="3360">
+                <a:solidFill>
+                  <a:srgbClr val="000000"/>
+                </a:solidFill>
+                <a:latin typeface="Comfortaa Bold"/>
+                <a:ea typeface="Comfortaa Bold"/>
+                <a:cs typeface="Comfortaa Bold"/>
+                <a:sym typeface="Comfortaa Bold"/>
+              </a:defRPr>
+            </a:pPr>
+          </a:p>
+        </p:txBody>
+      </p:sp>
+    </p:spTree>
+  </p:cSld>
+  <p:clrMapOvr>
+    <a:masterClrMapping/>
+  </p:clrMapOvr>
+  <p:transition xmlns:p14="http://schemas.microsoft.com/office/powerpoint/2010/main" spd="med" advClick="1"/>
+</p:sld>
+</file>
+
+<file path=ppt/slides/slide35.xml><?xml version="1.0" encoding="utf-8"?>
+<p:sld xmlns:a="http://schemas.openxmlformats.org/drawingml/2006/main" xmlns:r="http://schemas.openxmlformats.org/officeDocument/2006/relationships" xmlns:p="http://schemas.openxmlformats.org/presentationml/2006/main" xmlns:m="http://schemas.openxmlformats.org/officeDocument/2006/math" xmlns:a14="http://schemas.microsoft.com/office/drawing/2010/main" showMasterSp="1" showMasterPhAnim="1">
   <p:cSld>
     <p:bg>
       <p:bgPr>
@@ -5423,7 +5773,7 @@
       </p:grpSpPr>
       <p:sp>
         <p:nvSpPr>
-          <p:cNvPr id="187" name="Family Photo"/>
+          <p:cNvPr id="195" name="Title"/>
           <p:cNvSpPr txBox="1"/>
           <p:nvPr>
             <p:ph type="ctrTitle"/>
@@ -5431,8 +5781,8 @@
         </p:nvSpPr>
         <p:spPr>
           <a:xfrm>
-            <a:off x="897135" y="4119016"/>
-            <a:ext cx="11210530" cy="1515568"/>
+            <a:off x="1270000" y="4115444"/>
+            <a:ext cx="10464800" cy="1522712"/>
           </a:xfrm>
           <a:prstGeom prst="rect">
             <a:avLst/>
@@ -5440,8 +5790,9 @@
         </p:spPr>
         <p:txBody>
           <a:bodyPr/>
-          <a:lstStyle>
-            <a:lvl1pPr>
+          <a:lstStyle/>
+          <a:p>
+            <a:pPr>
               <a:defRPr>
                 <a:solidFill>
                   <a:srgbClr val="000000"/>
@@ -5451,13 +5802,7 @@
                 <a:cs typeface="Comfortaa Bold"/>
                 <a:sym typeface="Comfortaa Bold"/>
               </a:defRPr>
-            </a:lvl1pPr>
-          </a:lstStyle>
-          <a:p>
-            <a:pPr/>
-            <a:r>
-              <a:t>Family Photo</a:t>
-            </a:r>
+            </a:pPr>
           </a:p>
         </p:txBody>
       </p:sp>
@@ -5470,8 +5815,8 @@
 </p:sld>
 </file>
 
-<file path=ppt/slides/slide33.xml><?xml version="1.0" encoding="utf-8"?>
-<p:sld xmlns:a="http://schemas.openxmlformats.org/drawingml/2006/main" xmlns:r="http://schemas.openxmlformats.org/officeDocument/2006/relationships" xmlns:p="http://schemas.openxmlformats.org/presentationml/2006/main" showMasterSp="1" showMasterPhAnim="1">
+<file path=ppt/slides/slide36.xml><?xml version="1.0" encoding="utf-8"?>
+<p:sld xmlns:a="http://schemas.openxmlformats.org/drawingml/2006/main" xmlns:r="http://schemas.openxmlformats.org/officeDocument/2006/relationships" xmlns:p="http://schemas.openxmlformats.org/presentationml/2006/main" xmlns:m="http://schemas.openxmlformats.org/officeDocument/2006/math" xmlns:a14="http://schemas.microsoft.com/office/drawing/2010/main" showMasterSp="1" showMasterPhAnim="1">
   <p:cSld>
     <p:bg>
       <p:bgPr>
@@ -5496,7 +5841,163 @@
       </p:grpSpPr>
       <p:sp>
         <p:nvSpPr>
-          <p:cNvPr id="189" name="Thank you"/>
+          <p:cNvPr id="197" name="Whenever you become a speaker we would love to share in your excitement!…"/>
+          <p:cNvSpPr txBox="1"/>
+          <p:nvPr/>
+        </p:nvSpPr>
+        <p:spPr>
+          <a:xfrm>
+            <a:off x="897135" y="1916906"/>
+            <a:ext cx="11210530" cy="3533925"/>
+          </a:xfrm>
+          <a:prstGeom prst="rect">
+            <a:avLst/>
+          </a:prstGeom>
+          <a:ln w="12700">
+            <a:miter lim="400000"/>
+          </a:ln>
+          <a:extLst>
+            <a:ext uri="{C572A759-6A51-4108-AA02-DFA0A04FC94B}">
+              <ma14:wrappingTextBoxFlag xmlns:ma14="http://schemas.microsoft.com/office/mac/drawingml/2011/main" val="1"/>
+            </a:ext>
+          </a:extLst>
+        </p:spPr>
+        <p:txBody>
+          <a:bodyPr lIns="50800" tIns="50800" rIns="50800" bIns="50800" anchor="b">
+            <a:normAutofit fontScale="100000" lnSpcReduction="0"/>
+          </a:bodyPr>
+          <a:lstStyle/>
+          <a:p>
+            <a:pPr defTabSz="292100">
+              <a:defRPr b="0" sz="4000">
+                <a:solidFill>
+                  <a:srgbClr val="000000"/>
+                </a:solidFill>
+                <a:latin typeface="Comfortaa Bold"/>
+                <a:ea typeface="Comfortaa Bold"/>
+                <a:cs typeface="Comfortaa Bold"/>
+                <a:sym typeface="Comfortaa Bold"/>
+              </a:defRPr>
+            </a:pPr>
+            <a:r>
+              <a:t>Whenever you become a speaker we would love to share in your excitement!</a:t>
+            </a:r>
+          </a:p>
+          <a:p>
+            <a:pPr defTabSz="292100">
+              <a:defRPr b="0" sz="4000">
+                <a:solidFill>
+                  <a:srgbClr val="000000"/>
+                </a:solidFill>
+                <a:latin typeface="Comfortaa Bold"/>
+                <a:ea typeface="Comfortaa Bold"/>
+                <a:cs typeface="Comfortaa Bold"/>
+                <a:sym typeface="Comfortaa Bold"/>
+              </a:defRPr>
+            </a:pPr>
+          </a:p>
+          <a:p>
+            <a:pPr defTabSz="292100">
+              <a:defRPr b="0" sz="4000">
+                <a:solidFill>
+                  <a:srgbClr val="000000"/>
+                </a:solidFill>
+                <a:latin typeface="Comfortaa Bold"/>
+                <a:ea typeface="Comfortaa Bold"/>
+                <a:cs typeface="Comfortaa Bold"/>
+                <a:sym typeface="Comfortaa Bold"/>
+              </a:defRPr>
+            </a:pPr>
+            <a:r>
+              <a:t>Please keep us up-to-date with your adventures by completing the form at:</a:t>
+            </a:r>
+          </a:p>
+        </p:txBody>
+      </p:sp>
+      <p:sp>
+        <p:nvSpPr>
+          <p:cNvPr id="198" name="https://www.globaldiversitycfpday.com/celebrate"/>
+          <p:cNvSpPr txBox="1"/>
+          <p:nvPr/>
+        </p:nvSpPr>
+        <p:spPr>
+          <a:xfrm>
+            <a:off x="897135" y="5973216"/>
+            <a:ext cx="11210530" cy="1515568"/>
+          </a:xfrm>
+          <a:prstGeom prst="rect">
+            <a:avLst/>
+          </a:prstGeom>
+          <a:ln w="12700">
+            <a:miter lim="400000"/>
+          </a:ln>
+          <a:extLst>
+            <a:ext uri="{C572A759-6A51-4108-AA02-DFA0A04FC94B}">
+              <ma14:wrappingTextBoxFlag xmlns:ma14="http://schemas.microsoft.com/office/mac/drawingml/2011/main" val="1"/>
+            </a:ext>
+          </a:extLst>
+        </p:spPr>
+        <p:txBody>
+          <a:bodyPr lIns="50800" tIns="50800" rIns="50800" bIns="50800" anchor="b">
+            <a:normAutofit fontScale="100000" lnSpcReduction="0"/>
+          </a:bodyPr>
+          <a:lstStyle>
+            <a:lvl1pPr>
+              <a:defRPr b="0" sz="3300">
+                <a:solidFill>
+                  <a:srgbClr val="000000"/>
+                </a:solidFill>
+                <a:latin typeface="Comfortaa Bold"/>
+                <a:ea typeface="Comfortaa Bold"/>
+                <a:cs typeface="Comfortaa Bold"/>
+                <a:sym typeface="Comfortaa Bold"/>
+              </a:defRPr>
+            </a:lvl1pPr>
+          </a:lstStyle>
+          <a:p>
+            <a:pPr/>
+            <a:r>
+              <a:t>https://www.globaldiversitycfpday.com/celebrate</a:t>
+            </a:r>
+          </a:p>
+        </p:txBody>
+      </p:sp>
+    </p:spTree>
+  </p:cSld>
+  <p:clrMapOvr>
+    <a:masterClrMapping/>
+  </p:clrMapOvr>
+  <p:transition xmlns:p14="http://schemas.microsoft.com/office/powerpoint/2010/main" spd="med" advClick="1"/>
+</p:sld>
+</file>
+
+<file path=ppt/slides/slide37.xml><?xml version="1.0" encoding="utf-8"?>
+<p:sld xmlns:a="http://schemas.openxmlformats.org/drawingml/2006/main" xmlns:r="http://schemas.openxmlformats.org/officeDocument/2006/relationships" xmlns:p="http://schemas.openxmlformats.org/presentationml/2006/main" xmlns:m="http://schemas.openxmlformats.org/officeDocument/2006/math" xmlns:a14="http://schemas.microsoft.com/office/drawing/2010/main" showMasterSp="1" showMasterPhAnim="1">
+  <p:cSld>
+    <p:bg>
+      <p:bgPr>
+        <a:solidFill>
+          <a:srgbClr val="FFFF92"/>
+        </a:solidFill>
+      </p:bgPr>
+    </p:bg>
+    <p:spTree>
+      <p:nvGrpSpPr>
+        <p:cNvPr id="1" name=""/>
+        <p:cNvGrpSpPr/>
+        <p:nvPr/>
+      </p:nvGrpSpPr>
+      <p:grpSpPr>
+        <a:xfrm>
+          <a:off x="0" y="0"/>
+          <a:ext cx="0" cy="0"/>
+          <a:chOff x="0" y="0"/>
+          <a:chExt cx="0" cy="0"/>
+        </a:xfrm>
+      </p:grpSpPr>
+      <p:sp>
+        <p:nvSpPr>
+          <p:cNvPr id="200" name="Family Photo"/>
           <p:cNvSpPr txBox="1"/>
           <p:nvPr>
             <p:ph type="ctrTitle"/>
@@ -5529,7 +6030,7 @@
           <a:p>
             <a:pPr/>
             <a:r>
-              <a:t>Thank you</a:t>
+              <a:t>Family Photo</a:t>
             </a:r>
           </a:p>
         </p:txBody>
@@ -5543,8 +6044,81 @@
 </p:sld>
 </file>
 
-<file path=ppt/slides/slide34.xml><?xml version="1.0" encoding="utf-8"?>
-<p:sld xmlns:a="http://schemas.openxmlformats.org/drawingml/2006/main" xmlns:r="http://schemas.openxmlformats.org/officeDocument/2006/relationships" xmlns:p="http://schemas.openxmlformats.org/presentationml/2006/main" showMasterSp="1" showMasterPhAnim="1">
+<file path=ppt/slides/slide38.xml><?xml version="1.0" encoding="utf-8"?>
+<p:sld xmlns:a="http://schemas.openxmlformats.org/drawingml/2006/main" xmlns:r="http://schemas.openxmlformats.org/officeDocument/2006/relationships" xmlns:p="http://schemas.openxmlformats.org/presentationml/2006/main" xmlns:m="http://schemas.openxmlformats.org/officeDocument/2006/math" xmlns:a14="http://schemas.microsoft.com/office/drawing/2010/main" showMasterSp="1" showMasterPhAnim="1">
+  <p:cSld>
+    <p:bg>
+      <p:bgPr>
+        <a:solidFill>
+          <a:srgbClr val="FFFF92"/>
+        </a:solidFill>
+      </p:bgPr>
+    </p:bg>
+    <p:spTree>
+      <p:nvGrpSpPr>
+        <p:cNvPr id="1" name=""/>
+        <p:cNvGrpSpPr/>
+        <p:nvPr/>
+      </p:nvGrpSpPr>
+      <p:grpSpPr>
+        <a:xfrm>
+          <a:off x="0" y="0"/>
+          <a:ext cx="0" cy="0"/>
+          <a:chOff x="0" y="0"/>
+          <a:chExt cx="0" cy="0"/>
+        </a:xfrm>
+      </p:grpSpPr>
+      <p:sp>
+        <p:nvSpPr>
+          <p:cNvPr id="202" name="Thank you"/>
+          <p:cNvSpPr txBox="1"/>
+          <p:nvPr>
+            <p:ph type="ctrTitle"/>
+          </p:nvPr>
+        </p:nvSpPr>
+        <p:spPr>
+          <a:xfrm>
+            <a:off x="897135" y="4119016"/>
+            <a:ext cx="11210530" cy="1515568"/>
+          </a:xfrm>
+          <a:prstGeom prst="rect">
+            <a:avLst/>
+          </a:prstGeom>
+        </p:spPr>
+        <p:txBody>
+          <a:bodyPr/>
+          <a:lstStyle>
+            <a:lvl1pPr>
+              <a:defRPr>
+                <a:solidFill>
+                  <a:srgbClr val="000000"/>
+                </a:solidFill>
+                <a:latin typeface="Comfortaa Bold"/>
+                <a:ea typeface="Comfortaa Bold"/>
+                <a:cs typeface="Comfortaa Bold"/>
+                <a:sym typeface="Comfortaa Bold"/>
+              </a:defRPr>
+            </a:lvl1pPr>
+          </a:lstStyle>
+          <a:p>
+            <a:pPr/>
+            <a:r>
+              <a:t>Thank you</a:t>
+            </a:r>
+          </a:p>
+        </p:txBody>
+      </p:sp>
+    </p:spTree>
+  </p:cSld>
+  <p:clrMapOvr>
+    <a:masterClrMapping/>
+  </p:clrMapOvr>
+  <p:transition xmlns:p14="http://schemas.microsoft.com/office/powerpoint/2010/main" spd="med" advClick="1"/>
+</p:sld>
+</file>
+
+<file path=ppt/slides/slide39.xml><?xml version="1.0" encoding="utf-8"?>
+<p:sld xmlns:a="http://schemas.openxmlformats.org/drawingml/2006/main" xmlns:r="http://schemas.openxmlformats.org/officeDocument/2006/relationships" xmlns:p="http://schemas.openxmlformats.org/presentationml/2006/main" xmlns:m="http://schemas.openxmlformats.org/officeDocument/2006/math" xmlns:a14="http://schemas.microsoft.com/office/drawing/2010/main" showMasterSp="1" showMasterPhAnim="1">
   <p:cSld>
     <p:bg>
       <p:bgPr>
@@ -5577,7 +6151,7 @@
 </file>
 
 <file path=ppt/slides/slide4.xml><?xml version="1.0" encoding="utf-8"?>
-<p:sld xmlns:a="http://schemas.openxmlformats.org/drawingml/2006/main" xmlns:r="http://schemas.openxmlformats.org/officeDocument/2006/relationships" xmlns:p="http://schemas.openxmlformats.org/presentationml/2006/main" showMasterSp="1" showMasterPhAnim="1">
+<p:sld xmlns:a="http://schemas.openxmlformats.org/drawingml/2006/main" xmlns:r="http://schemas.openxmlformats.org/officeDocument/2006/relationships" xmlns:p="http://schemas.openxmlformats.org/presentationml/2006/main" xmlns:m="http://schemas.openxmlformats.org/officeDocument/2006/math" xmlns:a14="http://schemas.microsoft.com/office/drawing/2010/main" showMasterSp="1" showMasterPhAnim="1">
   <p:cSld>
     <p:bg>
       <p:bgPr>
@@ -5650,7 +6224,7 @@
 </file>
 
 <file path=ppt/slides/slide5.xml><?xml version="1.0" encoding="utf-8"?>
-<p:sld xmlns:a="http://schemas.openxmlformats.org/drawingml/2006/main" xmlns:r="http://schemas.openxmlformats.org/officeDocument/2006/relationships" xmlns:p="http://schemas.openxmlformats.org/presentationml/2006/main" showMasterSp="1" showMasterPhAnim="1">
+<p:sld xmlns:a="http://schemas.openxmlformats.org/drawingml/2006/main" xmlns:r="http://schemas.openxmlformats.org/officeDocument/2006/relationships" xmlns:p="http://schemas.openxmlformats.org/presentationml/2006/main" xmlns:m="http://schemas.openxmlformats.org/officeDocument/2006/math" xmlns:a14="http://schemas.microsoft.com/office/drawing/2010/main" showMasterSp="1" showMasterPhAnim="1">
   <p:cSld>
     <p:bg>
       <p:bgPr>
@@ -5985,7 +6559,7 @@
 </file>
 
 <file path=ppt/slides/slide6.xml><?xml version="1.0" encoding="utf-8"?>
-<p:sld xmlns:a="http://schemas.openxmlformats.org/drawingml/2006/main" xmlns:r="http://schemas.openxmlformats.org/officeDocument/2006/relationships" xmlns:p="http://schemas.openxmlformats.org/presentationml/2006/main" showMasterSp="1" showMasterPhAnim="1">
+<p:sld xmlns:a="http://schemas.openxmlformats.org/drawingml/2006/main" xmlns:r="http://schemas.openxmlformats.org/officeDocument/2006/relationships" xmlns:p="http://schemas.openxmlformats.org/presentationml/2006/main" xmlns:m="http://schemas.openxmlformats.org/officeDocument/2006/math" xmlns:a14="http://schemas.microsoft.com/office/drawing/2010/main" showMasterSp="1" showMasterPhAnim="1">
   <p:cSld>
     <p:bg>
       <p:bgPr>
@@ -6053,7 +6627,7 @@
 </file>
 
 <file path=ppt/slides/slide7.xml><?xml version="1.0" encoding="utf-8"?>
-<p:sld xmlns:a="http://schemas.openxmlformats.org/drawingml/2006/main" xmlns:r="http://schemas.openxmlformats.org/officeDocument/2006/relationships" xmlns:p="http://schemas.openxmlformats.org/presentationml/2006/main" showMasterSp="1" showMasterPhAnim="1">
+<p:sld xmlns:a="http://schemas.openxmlformats.org/drawingml/2006/main" xmlns:r="http://schemas.openxmlformats.org/officeDocument/2006/relationships" xmlns:p="http://schemas.openxmlformats.org/presentationml/2006/main" xmlns:m="http://schemas.openxmlformats.org/officeDocument/2006/math" xmlns:a14="http://schemas.microsoft.com/office/drawing/2010/main" showMasterSp="1" showMasterPhAnim="1">
   <p:cSld>
     <p:bg>
       <p:bgPr>
@@ -6155,7 +6729,7 @@
 </file>
 
 <file path=ppt/slides/slide8.xml><?xml version="1.0" encoding="utf-8"?>
-<p:sld xmlns:a="http://schemas.openxmlformats.org/drawingml/2006/main" xmlns:r="http://schemas.openxmlformats.org/officeDocument/2006/relationships" xmlns:p="http://schemas.openxmlformats.org/presentationml/2006/main" showMasterSp="1" showMasterPhAnim="1">
+<p:sld xmlns:a="http://schemas.openxmlformats.org/drawingml/2006/main" xmlns:r="http://schemas.openxmlformats.org/officeDocument/2006/relationships" xmlns:p="http://schemas.openxmlformats.org/presentationml/2006/main" xmlns:m="http://schemas.openxmlformats.org/officeDocument/2006/math" xmlns:a14="http://schemas.microsoft.com/office/drawing/2010/main" showMasterSp="1" showMasterPhAnim="1">
   <p:cSld>
     <p:bg>
       <p:bgPr>
@@ -6223,7 +6797,7 @@
 </file>
 
 <file path=ppt/slides/slide9.xml><?xml version="1.0" encoding="utf-8"?>
-<p:sld xmlns:a="http://schemas.openxmlformats.org/drawingml/2006/main" xmlns:r="http://schemas.openxmlformats.org/officeDocument/2006/relationships" xmlns:p="http://schemas.openxmlformats.org/presentationml/2006/main" showMasterSp="1" showMasterPhAnim="1">
+<p:sld xmlns:a="http://schemas.openxmlformats.org/drawingml/2006/main" xmlns:r="http://schemas.openxmlformats.org/officeDocument/2006/relationships" xmlns:p="http://schemas.openxmlformats.org/presentationml/2006/main" xmlns:m="http://schemas.openxmlformats.org/officeDocument/2006/math" xmlns:a14="http://schemas.microsoft.com/office/drawing/2010/main" showMasterSp="1" showMasterPhAnim="1">
   <p:cSld>
     <p:bg>
       <p:bgPr>

</xml_diff>

<commit_message>
Adding VueVixens to Slide Deck
</commit_message>
<xml_diff>
--- a/public/slides/global-diversity-cfp-day.pptx
+++ b/public/slides/global-diversity-cfp-day.pptx
@@ -47,6 +47,8 @@
     <p:sldId id="292" r:id="rId44"/>
     <p:sldId id="293" r:id="rId45"/>
     <p:sldId id="294" r:id="rId46"/>
+    <p:sldId id="295" r:id="rId47"/>
+    <p:sldId id="296" r:id="rId48"/>
   </p:sldIdLst>
   <p:sldSz cx="13004800" cy="9753600"/>
   <p:notesSz cx="6858000" cy="9144000"/>
@@ -5307,8 +5309,8 @@
         </p:blipFill>
         <p:spPr>
           <a:xfrm>
-            <a:off x="3538301" y="652611"/>
-            <a:ext cx="5928198" cy="5928197"/>
+            <a:off x="1887301" y="1731255"/>
+            <a:ext cx="3420890" cy="3420890"/>
           </a:xfrm>
           <a:prstGeom prst="rect">
             <a:avLst/>
@@ -5320,7 +5322,7 @@
       </p:pic>
       <p:sp>
         <p:nvSpPr>
-          <p:cNvPr id="187" name="@QueerJS meetups would ❤️ to have you speak at one of their future events"/>
+          <p:cNvPr id="187" name="@QueerJS &amp; @VueVixens are hosting meetups in March and would ❤️ to have you speak."/>
           <p:cNvSpPr txBox="1"/>
           <p:nvPr>
             <p:ph type="ctrTitle"/>
@@ -5338,8 +5340,8 @@
         <p:txBody>
           <a:bodyPr/>
           <a:lstStyle>
-            <a:lvl1pPr defTabSz="297941">
-              <a:defRPr sz="4284">
+            <a:lvl1pPr defTabSz="245363">
+              <a:defRPr sz="3528">
                 <a:solidFill>
                   <a:srgbClr val="000000"/>
                 </a:solidFill>
@@ -5353,11 +5355,40 @@
           <a:p>
             <a:pPr/>
             <a:r>
-              <a:t>@QueerJS meetups would ❤️ to have you speak at one of their future events</a:t>
+              <a:t>@QueerJS &amp; @VueVixens are hosting meetups in March and would ❤️ to have you speak.     </a:t>
             </a:r>
           </a:p>
         </p:txBody>
       </p:sp>
+      <p:pic>
+        <p:nvPicPr>
+          <p:cNvPr id="188" name="vue-vixens-logo.png" descr="vue-vixens-logo.png"/>
+          <p:cNvPicPr>
+            <a:picLocks noChangeAspect="1"/>
+          </p:cNvPicPr>
+          <p:nvPr/>
+        </p:nvPicPr>
+        <p:blipFill>
+          <a:blip r:embed="rId3">
+            <a:extLst/>
+          </a:blip>
+          <a:stretch>
+            <a:fillRect/>
+          </a:stretch>
+        </p:blipFill>
+        <p:spPr>
+          <a:xfrm>
+            <a:off x="6965285" y="1368936"/>
+            <a:ext cx="3770432" cy="3840728"/>
+          </a:xfrm>
+          <a:prstGeom prst="rect">
+            <a:avLst/>
+          </a:prstGeom>
+          <a:ln w="12700">
+            <a:miter lim="400000"/>
+          </a:ln>
+        </p:spPr>
+      </p:pic>
     </p:spTree>
   </p:cSld>
   <p:clrMapOvr>
@@ -5391,16 +5422,176 @@
           <a:chExt cx="0" cy="0"/>
         </a:xfrm>
       </p:grpSpPr>
+      <p:sp>
+        <p:nvSpPr>
+          <p:cNvPr id="190" name="Everyone is welcome to attend QueerJS.…"/>
+          <p:cNvSpPr txBox="1"/>
+          <p:nvPr>
+            <p:ph type="ctrTitle"/>
+          </p:nvPr>
+        </p:nvSpPr>
+        <p:spPr>
+          <a:xfrm>
+            <a:off x="897135" y="4341961"/>
+            <a:ext cx="10921208" cy="5022256"/>
+          </a:xfrm>
+          <a:prstGeom prst="rect">
+            <a:avLst/>
+          </a:prstGeom>
+        </p:spPr>
+        <p:txBody>
+          <a:bodyPr/>
+          <a:lstStyle/>
+          <a:p>
+            <a:pPr algn="l" defTabSz="233679">
+              <a:defRPr sz="3120">
+                <a:solidFill>
+                  <a:srgbClr val="000000"/>
+                </a:solidFill>
+                <a:latin typeface="Comfortaa Bold"/>
+                <a:ea typeface="Comfortaa Bold"/>
+                <a:cs typeface="Comfortaa Bold"/>
+                <a:sym typeface="Comfortaa Bold"/>
+              </a:defRPr>
+            </a:pPr>
+            <a:r>
+              <a:t>Everyone is welcome to attend QueerJS.</a:t>
+            </a:r>
+          </a:p>
+          <a:p>
+            <a:pPr algn="l" defTabSz="233679">
+              <a:defRPr sz="3120">
+                <a:solidFill>
+                  <a:srgbClr val="000000"/>
+                </a:solidFill>
+                <a:latin typeface="Comfortaa Bold"/>
+                <a:ea typeface="Comfortaa Bold"/>
+                <a:cs typeface="Comfortaa Bold"/>
+                <a:sym typeface="Comfortaa Bold"/>
+              </a:defRPr>
+            </a:pPr>
+            <a:r>
+              <a:t>All speakers are queer.</a:t>
+            </a:r>
+          </a:p>
+          <a:p>
+            <a:pPr algn="l" defTabSz="233679">
+              <a:defRPr sz="3120">
+                <a:solidFill>
+                  <a:srgbClr val="000000"/>
+                </a:solidFill>
+                <a:latin typeface="Comfortaa Bold"/>
+                <a:ea typeface="Comfortaa Bold"/>
+                <a:cs typeface="Comfortaa Bold"/>
+                <a:sym typeface="Comfortaa Bold"/>
+              </a:defRPr>
+            </a:pPr>
+          </a:p>
+          <a:p>
+            <a:pPr algn="l" defTabSz="233679">
+              <a:defRPr sz="3120">
+                <a:solidFill>
+                  <a:srgbClr val="000000"/>
+                </a:solidFill>
+                <a:latin typeface="Comfortaa Bold"/>
+                <a:ea typeface="Comfortaa Bold"/>
+                <a:cs typeface="Comfortaa Bold"/>
+                <a:sym typeface="Comfortaa Bold"/>
+              </a:defRPr>
+            </a:pPr>
+            <a:r>
+              <a:t>Technical &amp; non-technical talks are welcome.</a:t>
+            </a:r>
+          </a:p>
+          <a:p>
+            <a:pPr algn="l" defTabSz="233679">
+              <a:defRPr sz="3120">
+                <a:solidFill>
+                  <a:srgbClr val="000000"/>
+                </a:solidFill>
+                <a:latin typeface="Comfortaa Bold"/>
+                <a:ea typeface="Comfortaa Bold"/>
+                <a:cs typeface="Comfortaa Bold"/>
+                <a:sym typeface="Comfortaa Bold"/>
+              </a:defRPr>
+            </a:pPr>
+          </a:p>
+          <a:p>
+            <a:pPr algn="l" defTabSz="233679">
+              <a:defRPr sz="3120">
+                <a:solidFill>
+                  <a:srgbClr val="000000"/>
+                </a:solidFill>
+                <a:latin typeface="Comfortaa Bold"/>
+                <a:ea typeface="Comfortaa Bold"/>
+                <a:cs typeface="Comfortaa Bold"/>
+                <a:sym typeface="Comfortaa Bold"/>
+              </a:defRPr>
+            </a:pPr>
+            <a:r>
+              <a:t>Speaker travel support is provided up to 200 Euros.</a:t>
+            </a:r>
+          </a:p>
+          <a:p>
+            <a:pPr algn="l" defTabSz="233679">
+              <a:defRPr sz="3120">
+                <a:solidFill>
+                  <a:srgbClr val="000000"/>
+                </a:solidFill>
+                <a:latin typeface="Comfortaa Bold"/>
+                <a:ea typeface="Comfortaa Bold"/>
+                <a:cs typeface="Comfortaa Bold"/>
+                <a:sym typeface="Comfortaa Bold"/>
+              </a:defRPr>
+            </a:pPr>
+          </a:p>
+          <a:p>
+            <a:pPr algn="l" defTabSz="233679">
+              <a:defRPr sz="3120">
+                <a:solidFill>
+                  <a:srgbClr val="000000"/>
+                </a:solidFill>
+                <a:latin typeface="Comfortaa Bold"/>
+                <a:ea typeface="Comfortaa Bold"/>
+                <a:cs typeface="Comfortaa Bold"/>
+                <a:sym typeface="Comfortaa Bold"/>
+              </a:defRPr>
+            </a:pPr>
+            <a:r>
+              <a:t>Apply now at </a:t>
+            </a:r>
+            <a:r>
+              <a:rPr u="sng">
+                <a:hlinkClick r:id="rId2" invalidUrl="" action="" tgtFrame="" tooltip="" history="1" highlightClick="0" endSnd="0"/>
+              </a:rPr>
+              <a:t>https://queerjs.com/</a:t>
+            </a:r>
+          </a:p>
+          <a:p>
+            <a:pPr algn="l" defTabSz="233679">
+              <a:defRPr sz="3120">
+                <a:solidFill>
+                  <a:srgbClr val="000000"/>
+                </a:solidFill>
+                <a:latin typeface="Comfortaa Bold"/>
+                <a:ea typeface="Comfortaa Bold"/>
+                <a:cs typeface="Comfortaa Bold"/>
+                <a:sym typeface="Comfortaa Bold"/>
+              </a:defRPr>
+            </a:pPr>
+          </a:p>
+        </p:txBody>
+      </p:sp>
       <p:pic>
         <p:nvPicPr>
-          <p:cNvPr id="189" name="queerjs.png" descr="queerjs.png"/>
+          <p:cNvPr id="191" name="queerjs.png" descr="queerjs.png"/>
           <p:cNvPicPr>
             <a:picLocks noChangeAspect="1"/>
           </p:cNvPicPr>
           <p:nvPr/>
         </p:nvPicPr>
         <p:blipFill>
-          <a:blip r:embed="rId2">
+          <a:blip r:embed="rId3">
             <a:extLst/>
           </a:blip>
           <a:stretch>
@@ -5409,8 +5600,8 @@
         </p:blipFill>
         <p:spPr>
           <a:xfrm>
-            <a:off x="10002601" y="1630511"/>
-            <a:ext cx="1748856" cy="1748855"/>
+            <a:off x="1811101" y="766055"/>
+            <a:ext cx="3420890" cy="3420890"/>
           </a:xfrm>
           <a:prstGeom prst="rect">
             <a:avLst/>
@@ -5420,121 +5611,6 @@
           </a:ln>
         </p:spPr>
       </p:pic>
-      <p:sp>
-        <p:nvSpPr>
-          <p:cNvPr id="190" name="Everyone is welcome to attend QueerJS and all speakers are queer.…"/>
-          <p:cNvSpPr txBox="1"/>
-          <p:nvPr>
-            <p:ph type="ctrTitle"/>
-          </p:nvPr>
-        </p:nvSpPr>
-        <p:spPr>
-          <a:xfrm>
-            <a:off x="897135" y="4274889"/>
-            <a:ext cx="10921208" cy="5089328"/>
-          </a:xfrm>
-          <a:prstGeom prst="rect">
-            <a:avLst/>
-          </a:prstGeom>
-        </p:spPr>
-        <p:txBody>
-          <a:bodyPr/>
-          <a:lstStyle/>
-          <a:p>
-            <a:pPr algn="l" defTabSz="251206">
-              <a:defRPr sz="3612">
-                <a:solidFill>
-                  <a:srgbClr val="000000"/>
-                </a:solidFill>
-                <a:latin typeface="Comfortaa Bold"/>
-                <a:ea typeface="Comfortaa Bold"/>
-                <a:cs typeface="Comfortaa Bold"/>
-                <a:sym typeface="Comfortaa Bold"/>
-              </a:defRPr>
-            </a:pPr>
-            <a:r>
-              <a:t>Everyone is welcome to attend QueerJS and all speakers are queer.</a:t>
-            </a:r>
-          </a:p>
-          <a:p>
-            <a:pPr algn="l" defTabSz="251206">
-              <a:defRPr sz="3612">
-                <a:solidFill>
-                  <a:srgbClr val="000000"/>
-                </a:solidFill>
-                <a:latin typeface="Comfortaa Bold"/>
-                <a:ea typeface="Comfortaa Bold"/>
-                <a:cs typeface="Comfortaa Bold"/>
-                <a:sym typeface="Comfortaa Bold"/>
-              </a:defRPr>
-            </a:pPr>
-          </a:p>
-          <a:p>
-            <a:pPr algn="l" defTabSz="251206">
-              <a:defRPr sz="3612">
-                <a:solidFill>
-                  <a:srgbClr val="000000"/>
-                </a:solidFill>
-                <a:latin typeface="Comfortaa Bold"/>
-                <a:ea typeface="Comfortaa Bold"/>
-                <a:cs typeface="Comfortaa Bold"/>
-                <a:sym typeface="Comfortaa Bold"/>
-              </a:defRPr>
-            </a:pPr>
-            <a:r>
-              <a:t>Technical &amp; non-technical talks are welcome.</a:t>
-            </a:r>
-          </a:p>
-          <a:p>
-            <a:pPr algn="l" defTabSz="251206">
-              <a:defRPr sz="3612">
-                <a:solidFill>
-                  <a:srgbClr val="000000"/>
-                </a:solidFill>
-                <a:latin typeface="Comfortaa Bold"/>
-                <a:ea typeface="Comfortaa Bold"/>
-                <a:cs typeface="Comfortaa Bold"/>
-                <a:sym typeface="Comfortaa Bold"/>
-              </a:defRPr>
-            </a:pPr>
-          </a:p>
-          <a:p>
-            <a:pPr algn="l" defTabSz="251206">
-              <a:defRPr sz="3612">
-                <a:solidFill>
-                  <a:srgbClr val="000000"/>
-                </a:solidFill>
-                <a:latin typeface="Comfortaa Bold"/>
-                <a:ea typeface="Comfortaa Bold"/>
-                <a:cs typeface="Comfortaa Bold"/>
-                <a:sym typeface="Comfortaa Bold"/>
-              </a:defRPr>
-            </a:pPr>
-            <a:r>
-              <a:t>Apply now at </a:t>
-            </a:r>
-            <a:r>
-              <a:rPr u="sng">
-                <a:hlinkClick r:id="rId3" invalidUrl="" action="" tgtFrame="" tooltip="" history="1" highlightClick="0" endSnd="0"/>
-              </a:rPr>
-              <a:t>https://queerjs.com/</a:t>
-            </a:r>
-          </a:p>
-          <a:p>
-            <a:pPr algn="l" defTabSz="251206">
-              <a:defRPr sz="3612">
-                <a:solidFill>
-                  <a:srgbClr val="000000"/>
-                </a:solidFill>
-                <a:latin typeface="Comfortaa Bold"/>
-                <a:ea typeface="Comfortaa Bold"/>
-                <a:cs typeface="Comfortaa Bold"/>
-                <a:sym typeface="Comfortaa Bold"/>
-              </a:defRPr>
-            </a:pPr>
-          </a:p>
-        </p:txBody>
-      </p:sp>
     </p:spTree>
   </p:cSld>
   <p:clrMapOvr>
@@ -5568,9 +5644,134 @@
           <a:chExt cx="0" cy="0"/>
         </a:xfrm>
       </p:grpSpPr>
+      <p:sp>
+        <p:nvSpPr>
+          <p:cNvPr id="193" name="No QueerJS meetup in your location? Why not organise one?…"/>
+          <p:cNvSpPr txBox="1"/>
+          <p:nvPr>
+            <p:ph type="ctrTitle"/>
+          </p:nvPr>
+        </p:nvSpPr>
+        <p:spPr>
+          <a:xfrm>
+            <a:off x="884435" y="4110384"/>
+            <a:ext cx="10921208" cy="5304633"/>
+          </a:xfrm>
+          <a:prstGeom prst="rect">
+            <a:avLst/>
+          </a:prstGeom>
+        </p:spPr>
+        <p:txBody>
+          <a:bodyPr/>
+          <a:lstStyle/>
+          <a:p>
+            <a:pPr algn="l" defTabSz="239522">
+              <a:defRPr sz="3280">
+                <a:solidFill>
+                  <a:srgbClr val="000000"/>
+                </a:solidFill>
+                <a:latin typeface="Comfortaa Bold"/>
+                <a:ea typeface="Comfortaa Bold"/>
+                <a:cs typeface="Comfortaa Bold"/>
+                <a:sym typeface="Comfortaa Bold"/>
+              </a:defRPr>
+            </a:pPr>
+            <a:r>
+              <a:t>No QueerJS meetup in your location? Why not organise one?</a:t>
+            </a:r>
+          </a:p>
+          <a:p>
+            <a:pPr algn="l" defTabSz="239522">
+              <a:defRPr sz="3280">
+                <a:solidFill>
+                  <a:srgbClr val="000000"/>
+                </a:solidFill>
+                <a:latin typeface="Comfortaa Bold"/>
+                <a:ea typeface="Comfortaa Bold"/>
+                <a:cs typeface="Comfortaa Bold"/>
+                <a:sym typeface="Comfortaa Bold"/>
+              </a:defRPr>
+            </a:pPr>
+          </a:p>
+          <a:p>
+            <a:pPr algn="l" defTabSz="239522">
+              <a:defRPr sz="3280">
+                <a:solidFill>
+                  <a:srgbClr val="000000"/>
+                </a:solidFill>
+                <a:latin typeface="Comfortaa Bold"/>
+                <a:ea typeface="Comfortaa Bold"/>
+                <a:cs typeface="Comfortaa Bold"/>
+                <a:sym typeface="Comfortaa Bold"/>
+              </a:defRPr>
+            </a:pPr>
+            <a:r>
+              <a:t>The meetup has to be FREE to attend!</a:t>
+            </a:r>
+          </a:p>
+          <a:p>
+            <a:pPr algn="l" defTabSz="239522">
+              <a:defRPr sz="3280">
+                <a:solidFill>
+                  <a:srgbClr val="000000"/>
+                </a:solidFill>
+                <a:latin typeface="Comfortaa Bold"/>
+                <a:ea typeface="Comfortaa Bold"/>
+                <a:cs typeface="Comfortaa Bold"/>
+                <a:sym typeface="Comfortaa Bold"/>
+              </a:defRPr>
+            </a:pPr>
+          </a:p>
+          <a:p>
+            <a:pPr algn="l" defTabSz="239522">
+              <a:defRPr sz="3280">
+                <a:solidFill>
+                  <a:srgbClr val="000000"/>
+                </a:solidFill>
+                <a:latin typeface="Comfortaa Bold"/>
+                <a:ea typeface="Comfortaa Bold"/>
+                <a:cs typeface="Comfortaa Bold"/>
+                <a:sym typeface="Comfortaa Bold"/>
+              </a:defRPr>
+            </a:pPr>
+            <a:r>
+              <a:t>Get in touch via Discord to make it happen:  </a:t>
+            </a:r>
+          </a:p>
+          <a:p>
+            <a:pPr algn="l" defTabSz="239522">
+              <a:defRPr sz="3280">
+                <a:solidFill>
+                  <a:srgbClr val="000000"/>
+                </a:solidFill>
+                <a:latin typeface="Comfortaa Bold"/>
+                <a:ea typeface="Comfortaa Bold"/>
+                <a:cs typeface="Comfortaa Bold"/>
+                <a:sym typeface="Comfortaa Bold"/>
+              </a:defRPr>
+            </a:pPr>
+            <a:r>
+              <a:t>https://discord.gg/kaevuK</a:t>
+            </a:r>
+          </a:p>
+          <a:p>
+            <a:pPr algn="l" defTabSz="239522">
+              <a:defRPr sz="3280">
+                <a:solidFill>
+                  <a:srgbClr val="000000"/>
+                </a:solidFill>
+                <a:latin typeface="Comfortaa Bold"/>
+                <a:ea typeface="Comfortaa Bold"/>
+                <a:cs typeface="Comfortaa Bold"/>
+                <a:sym typeface="Comfortaa Bold"/>
+              </a:defRPr>
+            </a:pPr>
+          </a:p>
+        </p:txBody>
+      </p:sp>
       <p:pic>
         <p:nvPicPr>
-          <p:cNvPr id="192" name="queerjs.png" descr="queerjs.png"/>
+          <p:cNvPr id="194" name="queerjs.png" descr="queerjs.png"/>
           <p:cNvPicPr>
             <a:picLocks noChangeAspect="1"/>
           </p:cNvPicPr>
@@ -5586,8 +5787,8 @@
         </p:blipFill>
         <p:spPr>
           <a:xfrm>
-            <a:off x="10002601" y="1630511"/>
-            <a:ext cx="1748856" cy="1748855"/>
+            <a:off x="1811101" y="766055"/>
+            <a:ext cx="3420890" cy="3420890"/>
           </a:xfrm>
           <a:prstGeom prst="rect">
             <a:avLst/>
@@ -5597,147 +5798,6 @@
           </a:ln>
         </p:spPr>
       </p:pic>
-      <p:sp>
-        <p:nvSpPr>
-          <p:cNvPr id="193" name="No QueerJS meetup in your location? Why not organise one?…"/>
-          <p:cNvSpPr txBox="1"/>
-          <p:nvPr>
-            <p:ph type="ctrTitle"/>
-          </p:nvPr>
-        </p:nvSpPr>
-        <p:spPr>
-          <a:xfrm>
-            <a:off x="884435" y="3429198"/>
-            <a:ext cx="10921208" cy="5985819"/>
-          </a:xfrm>
-          <a:prstGeom prst="rect">
-            <a:avLst/>
-          </a:prstGeom>
-        </p:spPr>
-        <p:txBody>
-          <a:bodyPr/>
-          <a:lstStyle/>
-          <a:p>
-            <a:pPr algn="l" defTabSz="233679">
-              <a:defRPr sz="3360">
-                <a:solidFill>
-                  <a:srgbClr val="000000"/>
-                </a:solidFill>
-                <a:latin typeface="Comfortaa Bold"/>
-                <a:ea typeface="Comfortaa Bold"/>
-                <a:cs typeface="Comfortaa Bold"/>
-                <a:sym typeface="Comfortaa Bold"/>
-              </a:defRPr>
-            </a:pPr>
-            <a:r>
-              <a:t>No QueerJS meetup in your location? Why not organise one?</a:t>
-            </a:r>
-          </a:p>
-          <a:p>
-            <a:pPr algn="l" defTabSz="233679">
-              <a:defRPr sz="3360">
-                <a:solidFill>
-                  <a:srgbClr val="000000"/>
-                </a:solidFill>
-                <a:latin typeface="Comfortaa Bold"/>
-                <a:ea typeface="Comfortaa Bold"/>
-                <a:cs typeface="Comfortaa Bold"/>
-                <a:sym typeface="Comfortaa Bold"/>
-              </a:defRPr>
-            </a:pPr>
-          </a:p>
-          <a:p>
-            <a:pPr algn="l" defTabSz="233679">
-              <a:defRPr sz="3360">
-                <a:solidFill>
-                  <a:srgbClr val="000000"/>
-                </a:solidFill>
-                <a:latin typeface="Comfortaa Bold"/>
-                <a:ea typeface="Comfortaa Bold"/>
-                <a:cs typeface="Comfortaa Bold"/>
-                <a:sym typeface="Comfortaa Bold"/>
-              </a:defRPr>
-            </a:pPr>
-            <a:r>
-              <a:t>The meetup has to be FREE!</a:t>
-            </a:r>
-          </a:p>
-          <a:p>
-            <a:pPr algn="l" defTabSz="233679">
-              <a:defRPr sz="3360">
-                <a:solidFill>
-                  <a:srgbClr val="000000"/>
-                </a:solidFill>
-                <a:latin typeface="Comfortaa Bold"/>
-                <a:ea typeface="Comfortaa Bold"/>
-                <a:cs typeface="Comfortaa Bold"/>
-                <a:sym typeface="Comfortaa Bold"/>
-              </a:defRPr>
-            </a:pPr>
-            <a:r>
-              <a:t>Speaker travel support is provided up to 200 Euros.</a:t>
-            </a:r>
-          </a:p>
-          <a:p>
-            <a:pPr algn="l" defTabSz="233679">
-              <a:defRPr sz="3360">
-                <a:solidFill>
-                  <a:srgbClr val="000000"/>
-                </a:solidFill>
-                <a:latin typeface="Comfortaa Bold"/>
-                <a:ea typeface="Comfortaa Bold"/>
-                <a:cs typeface="Comfortaa Bold"/>
-                <a:sym typeface="Comfortaa Bold"/>
-              </a:defRPr>
-            </a:pPr>
-          </a:p>
-          <a:p>
-            <a:pPr algn="l" defTabSz="233679">
-              <a:defRPr sz="3360">
-                <a:solidFill>
-                  <a:srgbClr val="000000"/>
-                </a:solidFill>
-                <a:latin typeface="Comfortaa Bold"/>
-                <a:ea typeface="Comfortaa Bold"/>
-                <a:cs typeface="Comfortaa Bold"/>
-                <a:sym typeface="Comfortaa Bold"/>
-              </a:defRPr>
-            </a:pPr>
-            <a:r>
-              <a:t>Get in touch via Discord: </a:t>
-            </a:r>
-          </a:p>
-          <a:p>
-            <a:pPr algn="l" defTabSz="233679">
-              <a:defRPr sz="3360">
-                <a:solidFill>
-                  <a:srgbClr val="000000"/>
-                </a:solidFill>
-                <a:latin typeface="Comfortaa Bold"/>
-                <a:ea typeface="Comfortaa Bold"/>
-                <a:cs typeface="Comfortaa Bold"/>
-                <a:sym typeface="Comfortaa Bold"/>
-              </a:defRPr>
-            </a:pPr>
-            <a:r>
-              <a:t>https://discord.gg/kaevuK</a:t>
-            </a:r>
-          </a:p>
-          <a:p>
-            <a:pPr algn="l" defTabSz="233679">
-              <a:defRPr sz="3360">
-                <a:solidFill>
-                  <a:srgbClr val="000000"/>
-                </a:solidFill>
-                <a:latin typeface="Comfortaa Bold"/>
-                <a:ea typeface="Comfortaa Bold"/>
-                <a:cs typeface="Comfortaa Bold"/>
-                <a:sym typeface="Comfortaa Bold"/>
-              </a:defRPr>
-            </a:pPr>
-          </a:p>
-        </p:txBody>
-      </p:sp>
     </p:spTree>
   </p:cSld>
   <p:clrMapOvr>
@@ -5771,29 +5831,66 @@
           <a:chExt cx="0" cy="0"/>
         </a:xfrm>
       </p:grpSpPr>
-      <p:sp>
-        <p:nvSpPr>
-          <p:cNvPr id="195" name="Title"/>
-          <p:cNvSpPr txBox="1"/>
-          <p:nvPr>
-            <p:ph type="ctrTitle"/>
-          </p:nvPr>
-        </p:nvSpPr>
+      <p:pic>
+        <p:nvPicPr>
+          <p:cNvPr id="196" name="vue-vixens-logo.png" descr="vue-vixens-logo.png"/>
+          <p:cNvPicPr>
+            <a:picLocks noChangeAspect="1"/>
+          </p:cNvPicPr>
+          <p:nvPr/>
+        </p:nvPicPr>
+        <p:blipFill>
+          <a:blip r:embed="rId2">
+            <a:extLst/>
+          </a:blip>
+          <a:stretch>
+            <a:fillRect/>
+          </a:stretch>
+        </p:blipFill>
         <p:spPr>
           <a:xfrm>
-            <a:off x="1270000" y="4115444"/>
-            <a:ext cx="10464800" cy="1522712"/>
+            <a:off x="6939885" y="556136"/>
+            <a:ext cx="3770432" cy="3840728"/>
           </a:xfrm>
           <a:prstGeom prst="rect">
             <a:avLst/>
           </a:prstGeom>
+          <a:ln w="12700">
+            <a:miter lim="400000"/>
+          </a:ln>
+        </p:spPr>
+      </p:pic>
+      <p:sp>
+        <p:nvSpPr>
+          <p:cNvPr id="197" name="Everyone is welcome to attend @VueVixens.…"/>
+          <p:cNvSpPr txBox="1"/>
+          <p:nvPr/>
+        </p:nvSpPr>
+        <p:spPr>
+          <a:xfrm>
+            <a:off x="1379735" y="4364384"/>
+            <a:ext cx="10921208" cy="5304633"/>
+          </a:xfrm>
+          <a:prstGeom prst="rect">
+            <a:avLst/>
+          </a:prstGeom>
+          <a:ln w="12700">
+            <a:miter lim="400000"/>
+          </a:ln>
+          <a:extLst>
+            <a:ext uri="{C572A759-6A51-4108-AA02-DFA0A04FC94B}">
+              <ma14:wrappingTextBoxFlag xmlns:ma14="http://schemas.microsoft.com/office/mac/drawingml/2011/main" val="1"/>
+            </a:ext>
+          </a:extLst>
         </p:spPr>
         <p:txBody>
-          <a:bodyPr/>
+          <a:bodyPr lIns="50800" tIns="50800" rIns="50800" bIns="50800" anchor="b">
+            <a:normAutofit fontScale="100000" lnSpcReduction="0"/>
+          </a:bodyPr>
           <a:lstStyle/>
           <a:p>
-            <a:pPr>
-              <a:defRPr>
+            <a:pPr algn="l" defTabSz="268731">
+              <a:defRPr b="0" sz="3680">
                 <a:solidFill>
                   <a:srgbClr val="000000"/>
                 </a:solidFill>
@@ -5803,6 +5900,112 @@
                 <a:sym typeface="Comfortaa Bold"/>
               </a:defRPr>
             </a:pPr>
+            <a:r>
+              <a:t>Everyone is welcome to attend @VueVixens.</a:t>
+            </a:r>
+          </a:p>
+          <a:p>
+            <a:pPr algn="l" defTabSz="268731">
+              <a:defRPr b="0" sz="3680">
+                <a:solidFill>
+                  <a:srgbClr val="000000"/>
+                </a:solidFill>
+                <a:latin typeface="Comfortaa Bold"/>
+                <a:ea typeface="Comfortaa Bold"/>
+                <a:cs typeface="Comfortaa Bold"/>
+                <a:sym typeface="Comfortaa Bold"/>
+              </a:defRPr>
+            </a:pPr>
+            <a:r>
+              <a:t>All speakers identify as women.</a:t>
+            </a:r>
+          </a:p>
+          <a:p>
+            <a:pPr algn="l" defTabSz="268731">
+              <a:defRPr b="0" sz="3680">
+                <a:solidFill>
+                  <a:srgbClr val="000000"/>
+                </a:solidFill>
+                <a:latin typeface="Comfortaa Bold"/>
+                <a:ea typeface="Comfortaa Bold"/>
+                <a:cs typeface="Comfortaa Bold"/>
+                <a:sym typeface="Comfortaa Bold"/>
+              </a:defRPr>
+            </a:pPr>
+          </a:p>
+          <a:p>
+            <a:pPr algn="l" defTabSz="268731">
+              <a:defRPr b="0" sz="3680">
+                <a:solidFill>
+                  <a:srgbClr val="000000"/>
+                </a:solidFill>
+                <a:latin typeface="Comfortaa Bold"/>
+                <a:ea typeface="Comfortaa Bold"/>
+                <a:cs typeface="Comfortaa Bold"/>
+                <a:sym typeface="Comfortaa Bold"/>
+              </a:defRPr>
+            </a:pPr>
+            <a:r>
+              <a:t>JS related talks are welcome.</a:t>
+            </a:r>
+          </a:p>
+          <a:p>
+            <a:pPr algn="l" defTabSz="268731">
+              <a:defRPr b="0" sz="3680">
+                <a:solidFill>
+                  <a:srgbClr val="000000"/>
+                </a:solidFill>
+                <a:latin typeface="Comfortaa Bold"/>
+                <a:ea typeface="Comfortaa Bold"/>
+                <a:cs typeface="Comfortaa Bold"/>
+                <a:sym typeface="Comfortaa Bold"/>
+              </a:defRPr>
+            </a:pPr>
+          </a:p>
+          <a:p>
+            <a:pPr algn="l" defTabSz="268731">
+              <a:defRPr b="0" sz="3680">
+                <a:solidFill>
+                  <a:srgbClr val="000000"/>
+                </a:solidFill>
+                <a:latin typeface="Comfortaa Bold"/>
+                <a:ea typeface="Comfortaa Bold"/>
+                <a:cs typeface="Comfortaa Bold"/>
+                <a:sym typeface="Comfortaa Bold"/>
+              </a:defRPr>
+            </a:pPr>
+            <a:r>
+              <a:t>No speaker travel support available.</a:t>
+            </a:r>
+          </a:p>
+          <a:p>
+            <a:pPr algn="l" defTabSz="268731">
+              <a:defRPr b="0" sz="3680">
+                <a:solidFill>
+                  <a:srgbClr val="000000"/>
+                </a:solidFill>
+                <a:latin typeface="Comfortaa Bold"/>
+                <a:ea typeface="Comfortaa Bold"/>
+                <a:cs typeface="Comfortaa Bold"/>
+                <a:sym typeface="Comfortaa Bold"/>
+              </a:defRPr>
+            </a:pPr>
+          </a:p>
+          <a:p>
+            <a:pPr algn="l" defTabSz="268731">
+              <a:defRPr b="0" sz="3680">
+                <a:solidFill>
+                  <a:srgbClr val="000000"/>
+                </a:solidFill>
+                <a:latin typeface="Comfortaa Bold"/>
+                <a:ea typeface="Comfortaa Bold"/>
+                <a:cs typeface="Comfortaa Bold"/>
+                <a:sym typeface="Comfortaa Bold"/>
+              </a:defRPr>
+            </a:pPr>
+            <a:r>
+              <a:t>Check twitter for details of how to apply</a:t>
+            </a:r>
           </a:p>
         </p:txBody>
       </p:sp>
@@ -5841,14 +6044,152 @@
       </p:grpSpPr>
       <p:sp>
         <p:nvSpPr>
-          <p:cNvPr id="197" name="Whenever you become a speaker we would love to share in your excitement!…"/>
+          <p:cNvPr id="199" name="No VueVixens chapter in your location? Why not become a chapter lead?…"/>
           <p:cNvSpPr txBox="1"/>
-          <p:nvPr/>
+          <p:nvPr>
+            <p:ph type="ctrTitle"/>
+          </p:nvPr>
         </p:nvSpPr>
         <p:spPr>
           <a:xfrm>
-            <a:off x="897135" y="1916906"/>
-            <a:ext cx="11210530" cy="3533925"/>
+            <a:off x="884435" y="4110384"/>
+            <a:ext cx="10921208" cy="5304633"/>
+          </a:xfrm>
+          <a:prstGeom prst="rect">
+            <a:avLst/>
+          </a:prstGeom>
+        </p:spPr>
+        <p:txBody>
+          <a:bodyPr/>
+          <a:lstStyle/>
+          <a:p>
+            <a:pPr algn="l" defTabSz="233679">
+              <a:defRPr sz="3200">
+                <a:solidFill>
+                  <a:srgbClr val="000000"/>
+                </a:solidFill>
+                <a:latin typeface="Comfortaa Bold"/>
+                <a:ea typeface="Comfortaa Bold"/>
+                <a:cs typeface="Comfortaa Bold"/>
+                <a:sym typeface="Comfortaa Bold"/>
+              </a:defRPr>
+            </a:pPr>
+            <a:r>
+              <a:t>No VueVixens chapter in your location? Why not become a chapter lead?</a:t>
+            </a:r>
+          </a:p>
+          <a:p>
+            <a:pPr algn="l" defTabSz="233679">
+              <a:defRPr sz="3200">
+                <a:solidFill>
+                  <a:srgbClr val="000000"/>
+                </a:solidFill>
+                <a:latin typeface="Comfortaa Bold"/>
+                <a:ea typeface="Comfortaa Bold"/>
+                <a:cs typeface="Comfortaa Bold"/>
+                <a:sym typeface="Comfortaa Bold"/>
+              </a:defRPr>
+            </a:pPr>
+          </a:p>
+          <a:p>
+            <a:pPr algn="l" defTabSz="233679">
+              <a:defRPr sz="3200">
+                <a:solidFill>
+                  <a:srgbClr val="000000"/>
+                </a:solidFill>
+                <a:latin typeface="Comfortaa Bold"/>
+                <a:ea typeface="Comfortaa Bold"/>
+                <a:cs typeface="Comfortaa Bold"/>
+                <a:sym typeface="Comfortaa Bold"/>
+              </a:defRPr>
+            </a:pPr>
+            <a:r>
+              <a:t>Chapter events have to be FREE!</a:t>
+            </a:r>
+          </a:p>
+          <a:p>
+            <a:pPr algn="l" defTabSz="233679">
+              <a:defRPr sz="3200">
+                <a:solidFill>
+                  <a:srgbClr val="000000"/>
+                </a:solidFill>
+                <a:latin typeface="Comfortaa Bold"/>
+                <a:ea typeface="Comfortaa Bold"/>
+                <a:cs typeface="Comfortaa Bold"/>
+                <a:sym typeface="Comfortaa Bold"/>
+              </a:defRPr>
+            </a:pPr>
+          </a:p>
+          <a:p>
+            <a:pPr algn="l" defTabSz="233679">
+              <a:defRPr sz="3200">
+                <a:solidFill>
+                  <a:srgbClr val="000000"/>
+                </a:solidFill>
+                <a:latin typeface="Comfortaa Bold"/>
+                <a:ea typeface="Comfortaa Bold"/>
+                <a:cs typeface="Comfortaa Bold"/>
+                <a:sym typeface="Comfortaa Bold"/>
+              </a:defRPr>
+            </a:pPr>
+            <a:r>
+              <a:t>Interested reach out to Diana Rodriguez in Slack </a:t>
+            </a:r>
+          </a:p>
+          <a:p>
+            <a:pPr algn="l" defTabSz="233679">
+              <a:defRPr sz="3200">
+                <a:solidFill>
+                  <a:srgbClr val="000000"/>
+                </a:solidFill>
+                <a:latin typeface="Comfortaa Bold"/>
+                <a:ea typeface="Comfortaa Bold"/>
+                <a:cs typeface="Comfortaa Bold"/>
+                <a:sym typeface="Comfortaa Bold"/>
+              </a:defRPr>
+            </a:pPr>
+            <a:r>
+              <a:rPr u="sng">
+                <a:hlinkClick r:id="rId2" invalidUrl="" action="" tgtFrame="" tooltip="" history="1" highlightClick="0" endSnd="0"/>
+              </a:rPr>
+              <a:t>https://communityinviter.com/apps/vuevixens/vue-vixens</a:t>
+            </a:r>
+          </a:p>
+          <a:p>
+            <a:pPr algn="l" defTabSz="233679">
+              <a:defRPr sz="3200">
+                <a:solidFill>
+                  <a:srgbClr val="000000"/>
+                </a:solidFill>
+                <a:latin typeface="Comfortaa Bold"/>
+                <a:ea typeface="Comfortaa Bold"/>
+                <a:cs typeface="Comfortaa Bold"/>
+                <a:sym typeface="Comfortaa Bold"/>
+              </a:defRPr>
+            </a:pPr>
+          </a:p>
+        </p:txBody>
+      </p:sp>
+      <p:pic>
+        <p:nvPicPr>
+          <p:cNvPr id="200" name="vue-vixens-logo.png" descr="vue-vixens-logo.png"/>
+          <p:cNvPicPr>
+            <a:picLocks noChangeAspect="1"/>
+          </p:cNvPicPr>
+          <p:nvPr/>
+        </p:nvPicPr>
+        <p:blipFill>
+          <a:blip r:embed="rId3">
+            <a:extLst/>
+          </a:blip>
+          <a:stretch>
+            <a:fillRect/>
+          </a:stretch>
+        </p:blipFill>
+        <p:spPr>
+          <a:xfrm>
+            <a:off x="6939885" y="556136"/>
+            <a:ext cx="3770432" cy="3840728"/>
           </a:xfrm>
           <a:prstGeom prst="rect">
             <a:avLst/>
@@ -5856,112 +6197,8 @@
           <a:ln w="12700">
             <a:miter lim="400000"/>
           </a:ln>
-          <a:extLst>
-            <a:ext uri="{C572A759-6A51-4108-AA02-DFA0A04FC94B}">
-              <ma14:wrappingTextBoxFlag xmlns:ma14="http://schemas.microsoft.com/office/mac/drawingml/2011/main" val="1"/>
-            </a:ext>
-          </a:extLst>
         </p:spPr>
-        <p:txBody>
-          <a:bodyPr lIns="50800" tIns="50800" rIns="50800" bIns="50800" anchor="b">
-            <a:normAutofit fontScale="100000" lnSpcReduction="0"/>
-          </a:bodyPr>
-          <a:lstStyle/>
-          <a:p>
-            <a:pPr defTabSz="292100">
-              <a:defRPr b="0" sz="4000">
-                <a:solidFill>
-                  <a:srgbClr val="000000"/>
-                </a:solidFill>
-                <a:latin typeface="Comfortaa Bold"/>
-                <a:ea typeface="Comfortaa Bold"/>
-                <a:cs typeface="Comfortaa Bold"/>
-                <a:sym typeface="Comfortaa Bold"/>
-              </a:defRPr>
-            </a:pPr>
-            <a:r>
-              <a:t>Whenever you become a speaker we would love to share in your excitement!</a:t>
-            </a:r>
-          </a:p>
-          <a:p>
-            <a:pPr defTabSz="292100">
-              <a:defRPr b="0" sz="4000">
-                <a:solidFill>
-                  <a:srgbClr val="000000"/>
-                </a:solidFill>
-                <a:latin typeface="Comfortaa Bold"/>
-                <a:ea typeface="Comfortaa Bold"/>
-                <a:cs typeface="Comfortaa Bold"/>
-                <a:sym typeface="Comfortaa Bold"/>
-              </a:defRPr>
-            </a:pPr>
-          </a:p>
-          <a:p>
-            <a:pPr defTabSz="292100">
-              <a:defRPr b="0" sz="4000">
-                <a:solidFill>
-                  <a:srgbClr val="000000"/>
-                </a:solidFill>
-                <a:latin typeface="Comfortaa Bold"/>
-                <a:ea typeface="Comfortaa Bold"/>
-                <a:cs typeface="Comfortaa Bold"/>
-                <a:sym typeface="Comfortaa Bold"/>
-              </a:defRPr>
-            </a:pPr>
-            <a:r>
-              <a:t>Please keep us up-to-date with your adventures by completing the form at:</a:t>
-            </a:r>
-          </a:p>
-        </p:txBody>
-      </p:sp>
-      <p:sp>
-        <p:nvSpPr>
-          <p:cNvPr id="198" name="https://www.globaldiversitycfpday.com/celebrate"/>
-          <p:cNvSpPr txBox="1"/>
-          <p:nvPr/>
-        </p:nvSpPr>
-        <p:spPr>
-          <a:xfrm>
-            <a:off x="897135" y="5973216"/>
-            <a:ext cx="11210530" cy="1515568"/>
-          </a:xfrm>
-          <a:prstGeom prst="rect">
-            <a:avLst/>
-          </a:prstGeom>
-          <a:ln w="12700">
-            <a:miter lim="400000"/>
-          </a:ln>
-          <a:extLst>
-            <a:ext uri="{C572A759-6A51-4108-AA02-DFA0A04FC94B}">
-              <ma14:wrappingTextBoxFlag xmlns:ma14="http://schemas.microsoft.com/office/mac/drawingml/2011/main" val="1"/>
-            </a:ext>
-          </a:extLst>
-        </p:spPr>
-        <p:txBody>
-          <a:bodyPr lIns="50800" tIns="50800" rIns="50800" bIns="50800" anchor="b">
-            <a:normAutofit fontScale="100000" lnSpcReduction="0"/>
-          </a:bodyPr>
-          <a:lstStyle>
-            <a:lvl1pPr>
-              <a:defRPr b="0" sz="3300">
-                <a:solidFill>
-                  <a:srgbClr val="000000"/>
-                </a:solidFill>
-                <a:latin typeface="Comfortaa Bold"/>
-                <a:ea typeface="Comfortaa Bold"/>
-                <a:cs typeface="Comfortaa Bold"/>
-                <a:sym typeface="Comfortaa Bold"/>
-              </a:defRPr>
-            </a:lvl1pPr>
-          </a:lstStyle>
-          <a:p>
-            <a:pPr/>
-            <a:r>
-              <a:t>https://www.globaldiversitycfpday.com/celebrate</a:t>
-            </a:r>
-          </a:p>
-        </p:txBody>
-      </p:sp>
+      </p:pic>
     </p:spTree>
   </p:cSld>
   <p:clrMapOvr>
@@ -5997,7 +6234,7 @@
       </p:grpSpPr>
       <p:sp>
         <p:nvSpPr>
-          <p:cNvPr id="200" name="Family Photo"/>
+          <p:cNvPr id="202" name="Title"/>
           <p:cNvSpPr txBox="1"/>
           <p:nvPr>
             <p:ph type="ctrTitle"/>
@@ -6005,8 +6242,8 @@
         </p:nvSpPr>
         <p:spPr>
           <a:xfrm>
-            <a:off x="897135" y="4119016"/>
-            <a:ext cx="11210530" cy="1515568"/>
+            <a:off x="1270000" y="4115444"/>
+            <a:ext cx="10464800" cy="1522712"/>
           </a:xfrm>
           <a:prstGeom prst="rect">
             <a:avLst/>
@@ -6014,8 +6251,9 @@
         </p:spPr>
         <p:txBody>
           <a:bodyPr/>
-          <a:lstStyle>
-            <a:lvl1pPr>
+          <a:lstStyle/>
+          <a:p>
+            <a:pPr>
               <a:defRPr>
                 <a:solidFill>
                   <a:srgbClr val="000000"/>
@@ -6025,13 +6263,7 @@
                 <a:cs typeface="Comfortaa Bold"/>
                 <a:sym typeface="Comfortaa Bold"/>
               </a:defRPr>
-            </a:lvl1pPr>
-          </a:lstStyle>
-          <a:p>
-            <a:pPr/>
-            <a:r>
-              <a:t>Family Photo</a:t>
-            </a:r>
+            </a:pPr>
           </a:p>
         </p:txBody>
       </p:sp>
@@ -6070,26 +6302,109 @@
       </p:grpSpPr>
       <p:sp>
         <p:nvSpPr>
-          <p:cNvPr id="202" name="Thank you"/>
+          <p:cNvPr id="204" name="Whenever you become a speaker we would love to share in your excitement!…"/>
           <p:cNvSpPr txBox="1"/>
-          <p:nvPr>
-            <p:ph type="ctrTitle"/>
-          </p:nvPr>
+          <p:nvPr/>
         </p:nvSpPr>
         <p:spPr>
           <a:xfrm>
-            <a:off x="897135" y="4119016"/>
+            <a:off x="897135" y="1916906"/>
+            <a:ext cx="11210530" cy="3533925"/>
+          </a:xfrm>
+          <a:prstGeom prst="rect">
+            <a:avLst/>
+          </a:prstGeom>
+          <a:ln w="12700">
+            <a:miter lim="400000"/>
+          </a:ln>
+          <a:extLst>
+            <a:ext uri="{C572A759-6A51-4108-AA02-DFA0A04FC94B}">
+              <ma14:wrappingTextBoxFlag xmlns:ma14="http://schemas.microsoft.com/office/mac/drawingml/2011/main" val="1"/>
+            </a:ext>
+          </a:extLst>
+        </p:spPr>
+        <p:txBody>
+          <a:bodyPr lIns="50800" tIns="50800" rIns="50800" bIns="50800" anchor="b">
+            <a:normAutofit fontScale="100000" lnSpcReduction="0"/>
+          </a:bodyPr>
+          <a:lstStyle/>
+          <a:p>
+            <a:pPr defTabSz="292100">
+              <a:defRPr b="0" sz="4000">
+                <a:solidFill>
+                  <a:srgbClr val="000000"/>
+                </a:solidFill>
+                <a:latin typeface="Comfortaa Bold"/>
+                <a:ea typeface="Comfortaa Bold"/>
+                <a:cs typeface="Comfortaa Bold"/>
+                <a:sym typeface="Comfortaa Bold"/>
+              </a:defRPr>
+            </a:pPr>
+            <a:r>
+              <a:t>Whenever you become a speaker we would love to share in your excitement!</a:t>
+            </a:r>
+          </a:p>
+          <a:p>
+            <a:pPr defTabSz="292100">
+              <a:defRPr b="0" sz="4000">
+                <a:solidFill>
+                  <a:srgbClr val="000000"/>
+                </a:solidFill>
+                <a:latin typeface="Comfortaa Bold"/>
+                <a:ea typeface="Comfortaa Bold"/>
+                <a:cs typeface="Comfortaa Bold"/>
+                <a:sym typeface="Comfortaa Bold"/>
+              </a:defRPr>
+            </a:pPr>
+          </a:p>
+          <a:p>
+            <a:pPr defTabSz="292100">
+              <a:defRPr b="0" sz="4000">
+                <a:solidFill>
+                  <a:srgbClr val="000000"/>
+                </a:solidFill>
+                <a:latin typeface="Comfortaa Bold"/>
+                <a:ea typeface="Comfortaa Bold"/>
+                <a:cs typeface="Comfortaa Bold"/>
+                <a:sym typeface="Comfortaa Bold"/>
+              </a:defRPr>
+            </a:pPr>
+            <a:r>
+              <a:t>Please keep us up-to-date with your adventures by completing the form at:</a:t>
+            </a:r>
+          </a:p>
+        </p:txBody>
+      </p:sp>
+      <p:sp>
+        <p:nvSpPr>
+          <p:cNvPr id="205" name="https://www.globaldiversitycfpday.com/celebrate"/>
+          <p:cNvSpPr txBox="1"/>
+          <p:nvPr/>
+        </p:nvSpPr>
+        <p:spPr>
+          <a:xfrm>
+            <a:off x="897135" y="5973216"/>
             <a:ext cx="11210530" cy="1515568"/>
           </a:xfrm>
           <a:prstGeom prst="rect">
             <a:avLst/>
           </a:prstGeom>
+          <a:ln w="12700">
+            <a:miter lim="400000"/>
+          </a:ln>
+          <a:extLst>
+            <a:ext uri="{C572A759-6A51-4108-AA02-DFA0A04FC94B}">
+              <ma14:wrappingTextBoxFlag xmlns:ma14="http://schemas.microsoft.com/office/mac/drawingml/2011/main" val="1"/>
+            </a:ext>
+          </a:extLst>
         </p:spPr>
         <p:txBody>
-          <a:bodyPr/>
+          <a:bodyPr lIns="50800" tIns="50800" rIns="50800" bIns="50800" anchor="b">
+            <a:normAutofit fontScale="100000" lnSpcReduction="0"/>
+          </a:bodyPr>
           <a:lstStyle>
             <a:lvl1pPr>
-              <a:defRPr>
+              <a:defRPr b="0" sz="3300">
                 <a:solidFill>
                   <a:srgbClr val="000000"/>
                 </a:solidFill>
@@ -6103,7 +6418,7 @@
           <a:p>
             <a:pPr/>
             <a:r>
-              <a:t>Thank you</a:t>
+              <a:t>https://www.globaldiversitycfpday.com/celebrate</a:t>
             </a:r>
           </a:p>
         </p:txBody>
@@ -6141,6 +6456,46 @@
           <a:chExt cx="0" cy="0"/>
         </a:xfrm>
       </p:grpSpPr>
+      <p:sp>
+        <p:nvSpPr>
+          <p:cNvPr id="207" name="Family Photo"/>
+          <p:cNvSpPr txBox="1"/>
+          <p:nvPr>
+            <p:ph type="ctrTitle"/>
+          </p:nvPr>
+        </p:nvSpPr>
+        <p:spPr>
+          <a:xfrm>
+            <a:off x="897135" y="4119016"/>
+            <a:ext cx="11210530" cy="1515568"/>
+          </a:xfrm>
+          <a:prstGeom prst="rect">
+            <a:avLst/>
+          </a:prstGeom>
+        </p:spPr>
+        <p:txBody>
+          <a:bodyPr/>
+          <a:lstStyle>
+            <a:lvl1pPr>
+              <a:defRPr>
+                <a:solidFill>
+                  <a:srgbClr val="000000"/>
+                </a:solidFill>
+                <a:latin typeface="Comfortaa Bold"/>
+                <a:ea typeface="Comfortaa Bold"/>
+                <a:cs typeface="Comfortaa Bold"/>
+                <a:sym typeface="Comfortaa Bold"/>
+              </a:defRPr>
+            </a:lvl1pPr>
+          </a:lstStyle>
+          <a:p>
+            <a:pPr/>
+            <a:r>
+              <a:t>Family Photo</a:t>
+            </a:r>
+          </a:p>
+        </p:txBody>
+      </p:sp>
     </p:spTree>
   </p:cSld>
   <p:clrMapOvr>
@@ -6214,6 +6569,112 @@
           </a:p>
         </p:txBody>
       </p:sp>
+    </p:spTree>
+  </p:cSld>
+  <p:clrMapOvr>
+    <a:masterClrMapping/>
+  </p:clrMapOvr>
+  <p:transition xmlns:p14="http://schemas.microsoft.com/office/powerpoint/2010/main" spd="med" advClick="1"/>
+</p:sld>
+</file>
+
+<file path=ppt/slides/slide40.xml><?xml version="1.0" encoding="utf-8"?>
+<p:sld xmlns:a="http://schemas.openxmlformats.org/drawingml/2006/main" xmlns:r="http://schemas.openxmlformats.org/officeDocument/2006/relationships" xmlns:p="http://schemas.openxmlformats.org/presentationml/2006/main" xmlns:m="http://schemas.openxmlformats.org/officeDocument/2006/math" xmlns:a14="http://schemas.microsoft.com/office/drawing/2010/main" showMasterSp="1" showMasterPhAnim="1">
+  <p:cSld>
+    <p:bg>
+      <p:bgPr>
+        <a:solidFill>
+          <a:srgbClr val="FFFF92"/>
+        </a:solidFill>
+      </p:bgPr>
+    </p:bg>
+    <p:spTree>
+      <p:nvGrpSpPr>
+        <p:cNvPr id="1" name=""/>
+        <p:cNvGrpSpPr/>
+        <p:nvPr/>
+      </p:nvGrpSpPr>
+      <p:grpSpPr>
+        <a:xfrm>
+          <a:off x="0" y="0"/>
+          <a:ext cx="0" cy="0"/>
+          <a:chOff x="0" y="0"/>
+          <a:chExt cx="0" cy="0"/>
+        </a:xfrm>
+      </p:grpSpPr>
+      <p:sp>
+        <p:nvSpPr>
+          <p:cNvPr id="209" name="Thank you"/>
+          <p:cNvSpPr txBox="1"/>
+          <p:nvPr>
+            <p:ph type="ctrTitle"/>
+          </p:nvPr>
+        </p:nvSpPr>
+        <p:spPr>
+          <a:xfrm>
+            <a:off x="897135" y="4119016"/>
+            <a:ext cx="11210530" cy="1515568"/>
+          </a:xfrm>
+          <a:prstGeom prst="rect">
+            <a:avLst/>
+          </a:prstGeom>
+        </p:spPr>
+        <p:txBody>
+          <a:bodyPr/>
+          <a:lstStyle>
+            <a:lvl1pPr>
+              <a:defRPr>
+                <a:solidFill>
+                  <a:srgbClr val="000000"/>
+                </a:solidFill>
+                <a:latin typeface="Comfortaa Bold"/>
+                <a:ea typeface="Comfortaa Bold"/>
+                <a:cs typeface="Comfortaa Bold"/>
+                <a:sym typeface="Comfortaa Bold"/>
+              </a:defRPr>
+            </a:lvl1pPr>
+          </a:lstStyle>
+          <a:p>
+            <a:pPr/>
+            <a:r>
+              <a:t>Thank you</a:t>
+            </a:r>
+          </a:p>
+        </p:txBody>
+      </p:sp>
+    </p:spTree>
+  </p:cSld>
+  <p:clrMapOvr>
+    <a:masterClrMapping/>
+  </p:clrMapOvr>
+  <p:transition xmlns:p14="http://schemas.microsoft.com/office/powerpoint/2010/main" spd="med" advClick="1"/>
+</p:sld>
+</file>
+
+<file path=ppt/slides/slide41.xml><?xml version="1.0" encoding="utf-8"?>
+<p:sld xmlns:a="http://schemas.openxmlformats.org/drawingml/2006/main" xmlns:r="http://schemas.openxmlformats.org/officeDocument/2006/relationships" xmlns:p="http://schemas.openxmlformats.org/presentationml/2006/main" xmlns:m="http://schemas.openxmlformats.org/officeDocument/2006/math" xmlns:a14="http://schemas.microsoft.com/office/drawing/2010/main" showMasterSp="1" showMasterPhAnim="1">
+  <p:cSld>
+    <p:bg>
+      <p:bgPr>
+        <a:solidFill>
+          <a:srgbClr val="FFFF92"/>
+        </a:solidFill>
+      </p:bgPr>
+    </p:bg>
+    <p:spTree>
+      <p:nvGrpSpPr>
+        <p:cNvPr id="1" name=""/>
+        <p:cNvGrpSpPr/>
+        <p:nvPr/>
+      </p:nvGrpSpPr>
+      <p:grpSpPr>
+        <a:xfrm>
+          <a:off x="0" y="0"/>
+          <a:ext cx="0" cy="0"/>
+          <a:chOff x="0" y="0"/>
+          <a:chExt cx="0" cy="0"/>
+        </a:xfrm>
+      </p:grpSpPr>
     </p:spTree>
   </p:cSld>
   <p:clrMapOvr>

</xml_diff>